<commit_message>
Intership presentation (last update)
</commit_message>
<xml_diff>
--- a/Internship/OAUTH 2.pptx
+++ b/Internship/OAUTH 2.pptx
@@ -6,10 +6,11 @@
   </p:sldMasterIdLst>
   <p:sldIdLst>
     <p:sldId id="256" r:id="rId2"/>
-    <p:sldId id="268" r:id="rId3"/>
-    <p:sldId id="270" r:id="rId4"/>
-    <p:sldId id="271" r:id="rId5"/>
-    <p:sldId id="267" r:id="rId6"/>
+    <p:sldId id="273" r:id="rId3"/>
+    <p:sldId id="267" r:id="rId4"/>
+    <p:sldId id="268" r:id="rId5"/>
+    <p:sldId id="270" r:id="rId6"/>
+    <p:sldId id="271" r:id="rId7"/>
   </p:sldIdLst>
   <p:sldSz cx="12192000" cy="6858000"/>
   <p:notesSz cx="6858000" cy="9144000"/>
@@ -108,6 +109,11 @@
       </a:defRPr>
     </a:lvl9pPr>
   </p:defaultTextStyle>
+  <p:extLst>
+    <p:ext uri="{EFAFB233-063F-42B5-8137-9DF3F51BA10A}">
+      <p15:sldGuideLst xmlns:p15="http://schemas.microsoft.com/office/powerpoint/2012/main"/>
+    </p:ext>
+  </p:extLst>
 </p:presentation>
 </file>
 
@@ -258,7 +264,7 @@
           <a:p>
             <a:fld id="{6A258C76-90E2-4F05-942E-85AFB5F62861}" type="datetimeFigureOut">
               <a:rPr lang="pt-PT" smtClean="0"/>
-              <a:t>03/11/2021</a:t>
+              <a:t>04/11/2021</a:t>
             </a:fld>
             <a:endParaRPr lang="pt-PT"/>
           </a:p>
@@ -456,7 +462,7 @@
           <a:p>
             <a:fld id="{6A258C76-90E2-4F05-942E-85AFB5F62861}" type="datetimeFigureOut">
               <a:rPr lang="pt-PT" smtClean="0"/>
-              <a:t>03/11/2021</a:t>
+              <a:t>04/11/2021</a:t>
             </a:fld>
             <a:endParaRPr lang="pt-PT"/>
           </a:p>
@@ -664,7 +670,7 @@
           <a:p>
             <a:fld id="{6A258C76-90E2-4F05-942E-85AFB5F62861}" type="datetimeFigureOut">
               <a:rPr lang="pt-PT" smtClean="0"/>
-              <a:t>03/11/2021</a:t>
+              <a:t>04/11/2021</a:t>
             </a:fld>
             <a:endParaRPr lang="pt-PT"/>
           </a:p>
@@ -862,7 +868,7 @@
           <a:p>
             <a:fld id="{6A258C76-90E2-4F05-942E-85AFB5F62861}" type="datetimeFigureOut">
               <a:rPr lang="pt-PT" smtClean="0"/>
-              <a:t>03/11/2021</a:t>
+              <a:t>04/11/2021</a:t>
             </a:fld>
             <a:endParaRPr lang="pt-PT"/>
           </a:p>
@@ -1137,7 +1143,7 @@
           <a:p>
             <a:fld id="{6A258C76-90E2-4F05-942E-85AFB5F62861}" type="datetimeFigureOut">
               <a:rPr lang="pt-PT" smtClean="0"/>
-              <a:t>03/11/2021</a:t>
+              <a:t>04/11/2021</a:t>
             </a:fld>
             <a:endParaRPr lang="pt-PT"/>
           </a:p>
@@ -1402,7 +1408,7 @@
           <a:p>
             <a:fld id="{6A258C76-90E2-4F05-942E-85AFB5F62861}" type="datetimeFigureOut">
               <a:rPr lang="pt-PT" smtClean="0"/>
-              <a:t>03/11/2021</a:t>
+              <a:t>04/11/2021</a:t>
             </a:fld>
             <a:endParaRPr lang="pt-PT"/>
           </a:p>
@@ -1814,7 +1820,7 @@
           <a:p>
             <a:fld id="{6A258C76-90E2-4F05-942E-85AFB5F62861}" type="datetimeFigureOut">
               <a:rPr lang="pt-PT" smtClean="0"/>
-              <a:t>03/11/2021</a:t>
+              <a:t>04/11/2021</a:t>
             </a:fld>
             <a:endParaRPr lang="pt-PT"/>
           </a:p>
@@ -1955,7 +1961,7 @@
           <a:p>
             <a:fld id="{6A258C76-90E2-4F05-942E-85AFB5F62861}" type="datetimeFigureOut">
               <a:rPr lang="pt-PT" smtClean="0"/>
-              <a:t>03/11/2021</a:t>
+              <a:t>04/11/2021</a:t>
             </a:fld>
             <a:endParaRPr lang="pt-PT"/>
           </a:p>
@@ -2068,7 +2074,7 @@
           <a:p>
             <a:fld id="{6A258C76-90E2-4F05-942E-85AFB5F62861}" type="datetimeFigureOut">
               <a:rPr lang="pt-PT" smtClean="0"/>
-              <a:t>03/11/2021</a:t>
+              <a:t>04/11/2021</a:t>
             </a:fld>
             <a:endParaRPr lang="pt-PT"/>
           </a:p>
@@ -2379,7 +2385,7 @@
           <a:p>
             <a:fld id="{6A258C76-90E2-4F05-942E-85AFB5F62861}" type="datetimeFigureOut">
               <a:rPr lang="pt-PT" smtClean="0"/>
-              <a:t>03/11/2021</a:t>
+              <a:t>04/11/2021</a:t>
             </a:fld>
             <a:endParaRPr lang="pt-PT"/>
           </a:p>
@@ -2667,7 +2673,7 @@
           <a:p>
             <a:fld id="{6A258C76-90E2-4F05-942E-85AFB5F62861}" type="datetimeFigureOut">
               <a:rPr lang="pt-PT" smtClean="0"/>
-              <a:t>03/11/2021</a:t>
+              <a:t>04/11/2021</a:t>
             </a:fld>
             <a:endParaRPr lang="pt-PT"/>
           </a:p>
@@ -2908,7 +2914,7 @@
           <a:p>
             <a:fld id="{6A258C76-90E2-4F05-942E-85AFB5F62861}" type="datetimeFigureOut">
               <a:rPr lang="pt-PT" smtClean="0"/>
-              <a:t>03/11/2021</a:t>
+              <a:t>04/11/2021</a:t>
             </a:fld>
             <a:endParaRPr lang="pt-PT"/>
           </a:p>
@@ -3990,17 +3996,99 @@
                   <a:srgbClr val="FFFFFF"/>
                 </a:solidFill>
               </a:rPr>
-              <a:t>OAuth 2.0</a:t>
+              <a:t>Partilha de dados antes do OAUTH</a:t>
+            </a:r>
+          </a:p>
+        </p:txBody>
+      </p:sp>
+      <p:sp>
+        <p:nvSpPr>
+          <p:cNvPr id="11" name="CaixaDeTexto 10">
+            <a:extLst>
+              <a:ext uri="{FF2B5EF4-FFF2-40B4-BE49-F238E27FC236}">
+                <a16:creationId xmlns:a16="http://schemas.microsoft.com/office/drawing/2014/main" id="{E1D286D2-401C-49AB-9306-EA98AF708B52}"/>
+              </a:ext>
+            </a:extLst>
+          </p:cNvPr>
+          <p:cNvSpPr txBox="1"/>
+          <p:nvPr/>
+        </p:nvSpPr>
+        <p:spPr>
+          <a:xfrm>
+            <a:off x="7916778" y="2224756"/>
+            <a:ext cx="481264" cy="234000"/>
+          </a:xfrm>
+          <a:prstGeom prst="rect">
+            <a:avLst/>
+          </a:prstGeom>
+          <a:solidFill>
+            <a:schemeClr val="bg1"/>
+          </a:solidFill>
+        </p:spPr>
+        <p:txBody>
+          <a:bodyPr wrap="square" rtlCol="0">
+            <a:spAutoFit/>
+          </a:bodyPr>
+          <a:lstStyle/>
+          <a:p>
+            <a:r>
+              <a:rPr lang="pt-PT" dirty="0">
+                <a:solidFill>
+                  <a:schemeClr val="bg1"/>
+                </a:solidFill>
+              </a:rPr>
+              <a:t>a</a:t>
+            </a:r>
+          </a:p>
+        </p:txBody>
+      </p:sp>
+      <p:sp>
+        <p:nvSpPr>
+          <p:cNvPr id="13" name="CaixaDeTexto 12">
+            <a:extLst>
+              <a:ext uri="{FF2B5EF4-FFF2-40B4-BE49-F238E27FC236}">
+                <a16:creationId xmlns:a16="http://schemas.microsoft.com/office/drawing/2014/main" id="{7E70F115-55AD-4A25-A12F-71BD1D44E97E}"/>
+              </a:ext>
+            </a:extLst>
+          </p:cNvPr>
+          <p:cNvSpPr txBox="1"/>
+          <p:nvPr/>
+        </p:nvSpPr>
+        <p:spPr>
+          <a:xfrm>
+            <a:off x="7916778" y="5287477"/>
+            <a:ext cx="481264" cy="234000"/>
+          </a:xfrm>
+          <a:prstGeom prst="rect">
+            <a:avLst/>
+          </a:prstGeom>
+          <a:solidFill>
+            <a:schemeClr val="bg1"/>
+          </a:solidFill>
+        </p:spPr>
+        <p:txBody>
+          <a:bodyPr wrap="square" rtlCol="0">
+            <a:spAutoFit/>
+          </a:bodyPr>
+          <a:lstStyle/>
+          <a:p>
+            <a:r>
+              <a:rPr lang="pt-PT" dirty="0">
+                <a:solidFill>
+                  <a:schemeClr val="bg1"/>
+                </a:solidFill>
+              </a:rPr>
+              <a:t>a</a:t>
             </a:r>
           </a:p>
         </p:txBody>
       </p:sp>
       <p:pic>
         <p:nvPicPr>
-          <p:cNvPr id="9" name="Imagem 8" descr="Uma imagem com mesa&#10;&#10;Descrição gerada automaticamente">
-            <a:extLst>
-              <a:ext uri="{FF2B5EF4-FFF2-40B4-BE49-F238E27FC236}">
-                <a16:creationId xmlns:a16="http://schemas.microsoft.com/office/drawing/2014/main" id="{F0F88CF2-B2E7-42CF-9DDC-262E91197C32}"/>
+          <p:cNvPr id="4" name="Imagem 3" descr="Uma imagem com texto&#10;&#10;Descrição gerada automaticamente">
+            <a:extLst>
+              <a:ext uri="{FF2B5EF4-FFF2-40B4-BE49-F238E27FC236}">
+                <a16:creationId xmlns:a16="http://schemas.microsoft.com/office/drawing/2014/main" id="{234A7210-B265-446A-B43C-423541216509}"/>
               </a:ext>
             </a:extLst>
           </p:cNvPr>
@@ -4023,100 +4111,65 @@
         </p:blipFill>
         <p:spPr>
           <a:xfrm>
-            <a:off x="1274777" y="1639005"/>
-            <a:ext cx="9642446" cy="4543281"/>
+            <a:off x="2519468" y="1748903"/>
+            <a:ext cx="7153059" cy="4814559"/>
           </a:xfrm>
           <a:prstGeom prst="rect">
             <a:avLst/>
           </a:prstGeom>
         </p:spPr>
       </p:pic>
-      <p:sp>
-        <p:nvSpPr>
-          <p:cNvPr id="11" name="CaixaDeTexto 10">
-            <a:extLst>
-              <a:ext uri="{FF2B5EF4-FFF2-40B4-BE49-F238E27FC236}">
-                <a16:creationId xmlns:a16="http://schemas.microsoft.com/office/drawing/2014/main" id="{E1D286D2-401C-49AB-9306-EA98AF708B52}"/>
-              </a:ext>
-            </a:extLst>
-          </p:cNvPr>
-          <p:cNvSpPr txBox="1"/>
+      <p:pic>
+        <p:nvPicPr>
+          <p:cNvPr id="15" name="Picture 8" descr="CINTESIS - Investigação">
+            <a:extLst>
+              <a:ext uri="{FF2B5EF4-FFF2-40B4-BE49-F238E27FC236}">
+                <a16:creationId xmlns:a16="http://schemas.microsoft.com/office/drawing/2014/main" id="{DF9AA91F-1C4B-4297-A95F-16FD7045EFBC}"/>
+              </a:ext>
+            </a:extLst>
+          </p:cNvPr>
+          <p:cNvPicPr>
+            <a:picLocks noChangeAspect="1" noChangeArrowheads="1"/>
+          </p:cNvPicPr>
           <p:nvPr/>
-        </p:nvSpPr>
-        <p:spPr>
+        </p:nvPicPr>
+        <p:blipFill>
+          <a:blip r:embed="rId3">
+            <a:extLst>
+              <a:ext uri="{28A0092B-C50C-407E-A947-70E740481C1C}">
+                <a14:useLocalDpi xmlns:a14="http://schemas.microsoft.com/office/drawing/2010/main" val="0"/>
+              </a:ext>
+            </a:extLst>
+          </a:blip>
+          <a:srcRect/>
+          <a:stretch>
+            <a:fillRect/>
+          </a:stretch>
+        </p:blipFill>
+        <p:spPr bwMode="auto">
           <a:xfrm>
-            <a:off x="7916778" y="2224756"/>
-            <a:ext cx="481264" cy="234000"/>
+            <a:off x="10820400" y="6172200"/>
+            <a:ext cx="1371600" cy="685800"/>
           </a:xfrm>
           <a:prstGeom prst="rect">
             <a:avLst/>
           </a:prstGeom>
-          <a:solidFill>
-            <a:schemeClr val="bg1"/>
-          </a:solidFill>
-        </p:spPr>
-        <p:txBody>
-          <a:bodyPr wrap="square" rtlCol="0">
-            <a:spAutoFit/>
-          </a:bodyPr>
-          <a:lstStyle/>
-          <a:p>
-            <a:r>
-              <a:rPr lang="pt-PT" dirty="0">
+          <a:noFill/>
+          <a:extLst>
+            <a:ext uri="{909E8E84-426E-40DD-AFC4-6F175D3DCCD1}">
+              <a14:hiddenFill xmlns:a14="http://schemas.microsoft.com/office/drawing/2010/main">
                 <a:solidFill>
-                  <a:schemeClr val="bg1"/>
+                  <a:srgbClr val="FFFFFF"/>
                 </a:solidFill>
-              </a:rPr>
-              <a:t>a</a:t>
-            </a:r>
-          </a:p>
-        </p:txBody>
-      </p:sp>
-      <p:sp>
-        <p:nvSpPr>
-          <p:cNvPr id="13" name="CaixaDeTexto 12">
-            <a:extLst>
-              <a:ext uri="{FF2B5EF4-FFF2-40B4-BE49-F238E27FC236}">
-                <a16:creationId xmlns:a16="http://schemas.microsoft.com/office/drawing/2014/main" id="{7E70F115-55AD-4A25-A12F-71BD1D44E97E}"/>
-              </a:ext>
-            </a:extLst>
-          </p:cNvPr>
-          <p:cNvSpPr txBox="1"/>
-          <p:nvPr/>
-        </p:nvSpPr>
-        <p:spPr>
-          <a:xfrm>
-            <a:off x="7916778" y="5287477"/>
-            <a:ext cx="481264" cy="234000"/>
-          </a:xfrm>
-          <a:prstGeom prst="rect">
-            <a:avLst/>
-          </a:prstGeom>
-          <a:solidFill>
-            <a:schemeClr val="bg1"/>
-          </a:solidFill>
-        </p:spPr>
-        <p:txBody>
-          <a:bodyPr wrap="square" rtlCol="0">
-            <a:spAutoFit/>
-          </a:bodyPr>
-          <a:lstStyle/>
-          <a:p>
-            <a:r>
-              <a:rPr lang="pt-PT" dirty="0">
-                <a:solidFill>
-                  <a:schemeClr val="bg1"/>
-                </a:solidFill>
-              </a:rPr>
-              <a:t>a</a:t>
-            </a:r>
-          </a:p>
-        </p:txBody>
-      </p:sp>
+              </a14:hiddenFill>
+            </a:ext>
+          </a:extLst>
+        </p:spPr>
+      </p:pic>
     </p:spTree>
     <p:extLst>
       <p:ext uri="{BB962C8B-B14F-4D97-AF65-F5344CB8AC3E}">
-        <p14:creationId xmlns:p14="http://schemas.microsoft.com/office/powerpoint/2010/main" val="144438322"/>
+        <p14:creationId xmlns:p14="http://schemas.microsoft.com/office/powerpoint/2010/main" val="465812428"/>
       </p:ext>
     </p:extLst>
   </p:cSld>
@@ -4153,7 +4206,7 @@
       </p:grpSpPr>
       <p:sp useBgFill="1">
         <p:nvSpPr>
-          <p:cNvPr id="10" name="Rectangle 9">
+          <p:cNvPr id="8" name="Rectangle 7">
             <a:extLst>
               <a:ext uri="{FF2B5EF4-FFF2-40B4-BE49-F238E27FC236}">
                 <a16:creationId xmlns:a16="http://schemas.microsoft.com/office/drawing/2014/main" id="{1B15ED52-F352-441B-82BF-E0EA34836D08}"/>
@@ -4229,7 +4282,7 @@
       </p:sp>
       <p:sp>
         <p:nvSpPr>
-          <p:cNvPr id="12" name="Rectangle 11">
+          <p:cNvPr id="10" name="Rectangle 9">
             <a:extLst>
               <a:ext uri="{FF2B5EF4-FFF2-40B4-BE49-F238E27FC236}">
                 <a16:creationId xmlns:a16="http://schemas.microsoft.com/office/drawing/2014/main" id="{3B2E3793-BFE6-45A2-9B7B-E18844431C99}"/>
@@ -4302,7 +4355,7 @@
       </p:sp>
       <p:sp>
         <p:nvSpPr>
-          <p:cNvPr id="14" name="Rectangle 13">
+          <p:cNvPr id="12" name="Rectangle 11">
             <a:extLst>
               <a:ext uri="{FF2B5EF4-FFF2-40B4-BE49-F238E27FC236}">
                 <a16:creationId xmlns:a16="http://schemas.microsoft.com/office/drawing/2014/main" id="{BC4C4868-CB8F-4AF9-9CDB-8108F2C19B67}"/>
@@ -4378,7 +4431,7 @@
       </p:sp>
       <p:sp>
         <p:nvSpPr>
-          <p:cNvPr id="16" name="Rectangle 15">
+          <p:cNvPr id="14" name="Rectangle 13">
             <a:extLst>
               <a:ext uri="{FF2B5EF4-FFF2-40B4-BE49-F238E27FC236}">
                 <a16:creationId xmlns:a16="http://schemas.microsoft.com/office/drawing/2014/main" id="{375E0459-6403-40CD-989D-56A4407CA12E}"/>
@@ -4453,7 +4506,7 @@
       </p:sp>
       <p:sp>
         <p:nvSpPr>
-          <p:cNvPr id="18" name="Rectangle 17">
+          <p:cNvPr id="16" name="Rectangle 15">
             <a:extLst>
               <a:ext uri="{FF2B5EF4-FFF2-40B4-BE49-F238E27FC236}">
                 <a16:creationId xmlns:a16="http://schemas.microsoft.com/office/drawing/2014/main" id="{53E5B1A8-3AC9-4BD1-9BBC-78CA94F2D1BA}"/>
@@ -4532,7 +4585,7 @@
           <p:cNvPr id="2" name="Título 1">
             <a:extLst>
               <a:ext uri="{FF2B5EF4-FFF2-40B4-BE49-F238E27FC236}">
-                <a16:creationId xmlns:a16="http://schemas.microsoft.com/office/drawing/2014/main" id="{EF85517E-742F-4026-8637-95803F5A7D9D}"/>
+                <a16:creationId xmlns:a16="http://schemas.microsoft.com/office/drawing/2014/main" id="{94C7A8FE-17B1-4D7D-B0F1-F36EDBB388D6}"/>
               </a:ext>
             </a:extLst>
           </p:cNvPr>
@@ -4555,44 +4608,220 @@
           </a:bodyPr>
           <a:lstStyle/>
           <a:p>
-            <a:r>
-              <a:rPr lang="pt-PT" sz="4000" b="1" dirty="0" err="1">
-                <a:solidFill>
-                  <a:srgbClr val="FFFFFF"/>
-                </a:solidFill>
-              </a:rPr>
-              <a:t>OpenID</a:t>
-            </a:r>
             <a:r>
               <a:rPr lang="pt-PT" sz="4000" b="1" dirty="0">
                 <a:solidFill>
                   <a:srgbClr val="FFFFFF"/>
                 </a:solidFill>
               </a:rPr>
+              <a:t>Terminologias</a:t>
+            </a:r>
+          </a:p>
+        </p:txBody>
+      </p:sp>
+      <p:sp>
+        <p:nvSpPr>
+          <p:cNvPr id="3" name="Marcador de Posição de Conteúdo 2">
+            <a:extLst>
+              <a:ext uri="{FF2B5EF4-FFF2-40B4-BE49-F238E27FC236}">
+                <a16:creationId xmlns:a16="http://schemas.microsoft.com/office/drawing/2014/main" id="{C96F46EC-4830-414E-9E9D-240B7C3E04E7}"/>
+              </a:ext>
+            </a:extLst>
+          </p:cNvPr>
+          <p:cNvSpPr>
+            <a:spLocks noGrp="1"/>
+          </p:cNvSpPr>
+          <p:nvPr>
+            <p:ph idx="1"/>
+          </p:nvPr>
+        </p:nvSpPr>
+        <p:spPr>
+          <a:xfrm>
+            <a:off x="1371599" y="2021305"/>
+            <a:ext cx="9724031" cy="3980250"/>
+          </a:xfrm>
+        </p:spPr>
+        <p:txBody>
+          <a:bodyPr anchor="ctr">
+            <a:normAutofit/>
+          </a:bodyPr>
+          <a:lstStyle/>
+          <a:p>
+            <a:r>
+              <a:rPr lang="pt-PT" sz="2000" b="1" dirty="0" err="1"/>
+              <a:t>Resource</a:t>
+            </a:r>
+            <a:r>
+              <a:rPr lang="pt-PT" sz="2000" b="1" dirty="0"/>
               <a:t> </a:t>
             </a:r>
             <a:r>
-              <a:rPr lang="pt-PT" sz="4000" b="1" dirty="0" err="1">
-                <a:solidFill>
-                  <a:srgbClr val="FFFFFF"/>
-                </a:solidFill>
-              </a:rPr>
-              <a:t>Connect</a:t>
-            </a:r>
-            <a:endParaRPr lang="pt-PT" sz="4000" b="1" dirty="0">
-              <a:solidFill>
-                <a:srgbClr val="FFFFFF"/>
-              </a:solidFill>
-            </a:endParaRPr>
+              <a:rPr lang="pt-PT" sz="2000" b="1" dirty="0" err="1"/>
+              <a:t>Owner</a:t>
+            </a:r>
+            <a:r>
+              <a:rPr lang="pt-PT" sz="2000" b="1" dirty="0"/>
+              <a:t> – </a:t>
+            </a:r>
+            <a:r>
+              <a:rPr lang="pt-PT" sz="2000" dirty="0"/>
+              <a:t>Utilizador</a:t>
+            </a:r>
+          </a:p>
+          <a:p>
+            <a:r>
+              <a:rPr lang="pt-PT" sz="2000" b="1" dirty="0"/>
+              <a:t>Web App/</a:t>
+            </a:r>
+            <a:r>
+              <a:rPr lang="pt-PT" sz="2000" b="1" dirty="0" err="1"/>
+              <a:t>Client</a:t>
+            </a:r>
+            <a:r>
+              <a:rPr lang="pt-PT" sz="2000" b="1" dirty="0"/>
+              <a:t> – </a:t>
+            </a:r>
+            <a:r>
+              <a:rPr lang="pt-PT" sz="2000" dirty="0"/>
+              <a:t>Aplicação que está a tentar aceder aos dados</a:t>
+            </a:r>
+          </a:p>
+          <a:p>
+            <a:r>
+              <a:rPr lang="pt-PT" sz="2000" b="1" dirty="0" err="1"/>
+              <a:t>Authorization</a:t>
+            </a:r>
+            <a:r>
+              <a:rPr lang="pt-PT" sz="2000" b="1" dirty="0"/>
+              <a:t> Server – </a:t>
+            </a:r>
+            <a:r>
+              <a:rPr lang="pt-PT" sz="2000" dirty="0"/>
+              <a:t>Servidor de autorização</a:t>
+            </a:r>
+          </a:p>
+          <a:p>
+            <a:r>
+              <a:rPr lang="pt-PT" sz="2000" b="1" dirty="0" err="1"/>
+              <a:t>Resource</a:t>
+            </a:r>
+            <a:r>
+              <a:rPr lang="pt-PT" sz="2000" b="1" dirty="0"/>
+              <a:t> Server – </a:t>
+            </a:r>
+            <a:r>
+              <a:rPr lang="pt-PT" sz="2000" dirty="0"/>
+              <a:t>Servidor que contém os dados do Utilizador</a:t>
+            </a:r>
+          </a:p>
+          <a:p>
+            <a:r>
+              <a:rPr lang="pt-PT" sz="2000" b="1" dirty="0"/>
+              <a:t>Scope – </a:t>
+            </a:r>
+            <a:r>
+              <a:rPr lang="pt-PT" sz="2000" dirty="0"/>
+              <a:t>Informações a que a Web App quer ter acesso</a:t>
+            </a:r>
+            <a:endParaRPr lang="pt-PT" sz="2000" b="1" dirty="0"/>
+          </a:p>
+          <a:p>
+            <a:r>
+              <a:rPr lang="pt-PT" sz="2000" b="1" dirty="0" err="1"/>
+              <a:t>Authorization</a:t>
+            </a:r>
+            <a:r>
+              <a:rPr lang="pt-PT" sz="2000" b="1" dirty="0"/>
+              <a:t> Grant – </a:t>
+            </a:r>
+            <a:r>
+              <a:rPr lang="pt-PT" sz="2000" dirty="0"/>
+              <a:t>Pedido de permissões para o Utilizador aceitar ou recusar</a:t>
+            </a:r>
+          </a:p>
+          <a:p>
+            <a:r>
+              <a:rPr lang="pt-PT" sz="2000" b="1" dirty="0"/>
+              <a:t>Access </a:t>
+            </a:r>
+            <a:r>
+              <a:rPr lang="pt-PT" sz="2000" b="1" dirty="0" err="1"/>
+              <a:t>Token</a:t>
+            </a:r>
+            <a:r>
+              <a:rPr lang="pt-PT" sz="2000" b="1" dirty="0"/>
+              <a:t> – </a:t>
+            </a:r>
+            <a:r>
+              <a:rPr lang="pt-PT" sz="2000" dirty="0" err="1"/>
+              <a:t>Token</a:t>
+            </a:r>
+            <a:r>
+              <a:rPr lang="pt-PT" sz="2000" dirty="0"/>
+              <a:t> de acesso aos dados</a:t>
+            </a:r>
+          </a:p>
+          <a:p>
+            <a:r>
+              <a:rPr lang="pt-PT" sz="2000" b="1" dirty="0"/>
+              <a:t>ID </a:t>
+            </a:r>
+            <a:r>
+              <a:rPr lang="pt-PT" sz="2000" b="1" dirty="0" err="1"/>
+              <a:t>Token</a:t>
+            </a:r>
+            <a:r>
+              <a:rPr lang="pt-PT" sz="2000" b="1" dirty="0"/>
+              <a:t> – </a:t>
+            </a:r>
+            <a:r>
+              <a:rPr lang="pt-PT" sz="2000" dirty="0" err="1"/>
+              <a:t>Token</a:t>
+            </a:r>
+            <a:r>
+              <a:rPr lang="pt-PT" sz="2000" dirty="0"/>
+              <a:t> para autenticação</a:t>
+            </a:r>
+          </a:p>
+          <a:p>
+            <a:r>
+              <a:rPr lang="pt-PT" sz="2000" b="1" dirty="0"/>
+              <a:t>PKCE – </a:t>
+            </a:r>
+            <a:r>
+              <a:rPr lang="pt-PT" sz="2000" dirty="0" err="1"/>
+              <a:t>Proof</a:t>
+            </a:r>
+            <a:r>
+              <a:rPr lang="pt-PT" sz="2000" dirty="0"/>
+              <a:t> </a:t>
+            </a:r>
+            <a:r>
+              <a:rPr lang="pt-PT" sz="2000" dirty="0" err="1"/>
+              <a:t>Key</a:t>
+            </a:r>
+            <a:r>
+              <a:rPr lang="pt-PT" sz="2000" dirty="0"/>
+              <a:t> for </a:t>
+            </a:r>
+            <a:r>
+              <a:rPr lang="pt-PT" sz="2000" dirty="0" err="1"/>
+              <a:t>Code</a:t>
+            </a:r>
+            <a:r>
+              <a:rPr lang="pt-PT" sz="2000" dirty="0"/>
+              <a:t> Exchange</a:t>
+            </a:r>
+            <a:endParaRPr lang="pt-PT" sz="2000" b="1" dirty="0"/>
           </a:p>
         </p:txBody>
       </p:sp>
       <p:pic>
         <p:nvPicPr>
-          <p:cNvPr id="5" name="Picture 8" descr="CINTESIS - Investigação">
-            <a:extLst>
-              <a:ext uri="{FF2B5EF4-FFF2-40B4-BE49-F238E27FC236}">
-                <a16:creationId xmlns:a16="http://schemas.microsoft.com/office/drawing/2014/main" id="{0C37D708-E047-4DFC-99EB-D3DD6D4B61CB}"/>
+          <p:cNvPr id="9" name="Picture 8" descr="CINTESIS - Investigação">
+            <a:extLst>
+              <a:ext uri="{FF2B5EF4-FFF2-40B4-BE49-F238E27FC236}">
+                <a16:creationId xmlns:a16="http://schemas.microsoft.com/office/drawing/2014/main" id="{FC268026-AA9A-42E9-96EC-6E85C6836F6B}"/>
               </a:ext>
             </a:extLst>
           </p:cNvPr>
@@ -4634,216 +4863,10 @@
           </a:extLst>
         </p:spPr>
       </p:pic>
-      <p:pic>
-        <p:nvPicPr>
-          <p:cNvPr id="20" name="Imagem 19" descr="Uma imagem com mesa&#10;&#10;Descrição gerada automaticamente">
-            <a:extLst>
-              <a:ext uri="{FF2B5EF4-FFF2-40B4-BE49-F238E27FC236}">
-                <a16:creationId xmlns:a16="http://schemas.microsoft.com/office/drawing/2014/main" id="{BDBB35EF-A977-477B-A98A-8DC2309DDC48}"/>
-              </a:ext>
-            </a:extLst>
-          </p:cNvPr>
-          <p:cNvPicPr>
-            <a:picLocks noChangeAspect="1"/>
-          </p:cNvPicPr>
-          <p:nvPr/>
-        </p:nvPicPr>
-        <p:blipFill>
-          <a:blip r:embed="rId3">
-            <a:extLst>
-              <a:ext uri="{28A0092B-C50C-407E-A947-70E740481C1C}">
-                <a14:useLocalDpi xmlns:a14="http://schemas.microsoft.com/office/drawing/2010/main" val="0"/>
-              </a:ext>
-            </a:extLst>
-          </a:blip>
-          <a:stretch>
-            <a:fillRect/>
-          </a:stretch>
-        </p:blipFill>
-        <p:spPr>
-          <a:xfrm>
-            <a:off x="1274777" y="1628919"/>
-            <a:ext cx="9642446" cy="4543281"/>
-          </a:xfrm>
-          <a:prstGeom prst="rect">
-            <a:avLst/>
-          </a:prstGeom>
-        </p:spPr>
-      </p:pic>
-      <p:sp>
-        <p:nvSpPr>
-          <p:cNvPr id="21" name="CaixaDeTexto 20">
-            <a:extLst>
-              <a:ext uri="{FF2B5EF4-FFF2-40B4-BE49-F238E27FC236}">
-                <a16:creationId xmlns:a16="http://schemas.microsoft.com/office/drawing/2014/main" id="{17846D42-A81F-4C5B-8D4F-62A50F40C97F}"/>
-              </a:ext>
-            </a:extLst>
-          </p:cNvPr>
-          <p:cNvSpPr txBox="1"/>
-          <p:nvPr/>
-        </p:nvSpPr>
-        <p:spPr>
-          <a:xfrm>
-            <a:off x="6545179" y="2636861"/>
-            <a:ext cx="1764632" cy="276999"/>
-          </a:xfrm>
-          <a:prstGeom prst="rect">
-            <a:avLst/>
-          </a:prstGeom>
-          <a:noFill/>
-        </p:spPr>
-        <p:txBody>
-          <a:bodyPr wrap="square" rtlCol="0">
-            <a:spAutoFit/>
-          </a:bodyPr>
-          <a:lstStyle/>
-          <a:p>
-            <a:r>
-              <a:rPr lang="pt-PT" sz="1200" b="1" dirty="0"/>
-              <a:t>&amp; scope = </a:t>
-            </a:r>
-            <a:r>
-              <a:rPr lang="pt-PT" sz="1200" b="1" dirty="0" err="1"/>
-              <a:t>openid</a:t>
-            </a:r>
-            <a:r>
-              <a:rPr lang="pt-PT" sz="1200" b="1" dirty="0"/>
-              <a:t> </a:t>
-            </a:r>
-            <a:r>
-              <a:rPr lang="pt-PT" sz="1200" b="1" dirty="0" err="1"/>
-              <a:t>profile</a:t>
-            </a:r>
-            <a:endParaRPr lang="pt-PT" sz="1200" b="1" dirty="0"/>
-          </a:p>
-        </p:txBody>
-      </p:sp>
-      <p:sp>
-        <p:nvSpPr>
-          <p:cNvPr id="22" name="CaixaDeTexto 21">
-            <a:extLst>
-              <a:ext uri="{FF2B5EF4-FFF2-40B4-BE49-F238E27FC236}">
-                <a16:creationId xmlns:a16="http://schemas.microsoft.com/office/drawing/2014/main" id="{F318E3F6-6C43-46F3-BC08-1CCDE8722F39}"/>
-              </a:ext>
-            </a:extLst>
-          </p:cNvPr>
-          <p:cNvSpPr txBox="1"/>
-          <p:nvPr/>
-        </p:nvSpPr>
-        <p:spPr>
-          <a:xfrm>
-            <a:off x="6866021" y="4192945"/>
-            <a:ext cx="1764632" cy="276999"/>
-          </a:xfrm>
-          <a:prstGeom prst="rect">
-            <a:avLst/>
-          </a:prstGeom>
-          <a:noFill/>
-        </p:spPr>
-        <p:txBody>
-          <a:bodyPr wrap="square" rtlCol="0">
-            <a:spAutoFit/>
-          </a:bodyPr>
-          <a:lstStyle/>
-          <a:p>
-            <a:r>
-              <a:rPr lang="pt-PT" sz="1200" b="1" dirty="0"/>
-              <a:t>&amp; ID </a:t>
-            </a:r>
-            <a:r>
-              <a:rPr lang="pt-PT" sz="1200" b="1" dirty="0" err="1"/>
-              <a:t>token</a:t>
-            </a:r>
-            <a:endParaRPr lang="pt-PT" sz="1200" b="1" dirty="0"/>
-          </a:p>
-        </p:txBody>
-      </p:sp>
-      <p:sp>
-        <p:nvSpPr>
-          <p:cNvPr id="23" name="CaixaDeTexto 22">
-            <a:extLst>
-              <a:ext uri="{FF2B5EF4-FFF2-40B4-BE49-F238E27FC236}">
-                <a16:creationId xmlns:a16="http://schemas.microsoft.com/office/drawing/2014/main" id="{330D7B9E-57C1-4B3D-ADF3-FCD5EA479F00}"/>
-              </a:ext>
-            </a:extLst>
-          </p:cNvPr>
-          <p:cNvSpPr txBox="1"/>
-          <p:nvPr/>
-        </p:nvSpPr>
-        <p:spPr>
-          <a:xfrm>
-            <a:off x="7916778" y="2190607"/>
-            <a:ext cx="481264" cy="234000"/>
-          </a:xfrm>
-          <a:prstGeom prst="rect">
-            <a:avLst/>
-          </a:prstGeom>
-          <a:solidFill>
-            <a:schemeClr val="bg1"/>
-          </a:solidFill>
-        </p:spPr>
-        <p:txBody>
-          <a:bodyPr wrap="square" rtlCol="0">
-            <a:spAutoFit/>
-          </a:bodyPr>
-          <a:lstStyle/>
-          <a:p>
-            <a:r>
-              <a:rPr lang="pt-PT" dirty="0">
-                <a:solidFill>
-                  <a:schemeClr val="bg1"/>
-                </a:solidFill>
-              </a:rPr>
-              <a:t>a</a:t>
-            </a:r>
-          </a:p>
-        </p:txBody>
-      </p:sp>
-      <p:sp>
-        <p:nvSpPr>
-          <p:cNvPr id="24" name="CaixaDeTexto 23">
-            <a:extLst>
-              <a:ext uri="{FF2B5EF4-FFF2-40B4-BE49-F238E27FC236}">
-                <a16:creationId xmlns:a16="http://schemas.microsoft.com/office/drawing/2014/main" id="{5897A743-578C-4A78-AC28-0659E0A5C8EF}"/>
-              </a:ext>
-            </a:extLst>
-          </p:cNvPr>
-          <p:cNvSpPr txBox="1"/>
-          <p:nvPr/>
-        </p:nvSpPr>
-        <p:spPr>
-          <a:xfrm>
-            <a:off x="7916778" y="5253056"/>
-            <a:ext cx="481264" cy="234000"/>
-          </a:xfrm>
-          <a:prstGeom prst="rect">
-            <a:avLst/>
-          </a:prstGeom>
-          <a:solidFill>
-            <a:schemeClr val="bg1"/>
-          </a:solidFill>
-        </p:spPr>
-        <p:txBody>
-          <a:bodyPr wrap="square" rtlCol="0">
-            <a:spAutoFit/>
-          </a:bodyPr>
-          <a:lstStyle/>
-          <a:p>
-            <a:r>
-              <a:rPr lang="pt-PT" dirty="0">
-                <a:solidFill>
-                  <a:schemeClr val="bg1"/>
-                </a:solidFill>
-              </a:rPr>
-              <a:t>a</a:t>
-            </a:r>
-          </a:p>
-        </p:txBody>
-      </p:sp>
     </p:spTree>
     <p:extLst>
       <p:ext uri="{BB962C8B-B14F-4D97-AF65-F5344CB8AC3E}">
-        <p14:creationId xmlns:p14="http://schemas.microsoft.com/office/powerpoint/2010/main" val="2977591242"/>
+        <p14:creationId xmlns:p14="http://schemas.microsoft.com/office/powerpoint/2010/main" val="67633509"/>
       </p:ext>
     </p:extLst>
   </p:cSld>
@@ -4880,7 +4903,7 @@
       </p:grpSpPr>
       <p:sp useBgFill="1">
         <p:nvSpPr>
-          <p:cNvPr id="10" name="Rectangle 9">
+          <p:cNvPr id="8" name="Rectangle 7">
             <a:extLst>
               <a:ext uri="{FF2B5EF4-FFF2-40B4-BE49-F238E27FC236}">
                 <a16:creationId xmlns:a16="http://schemas.microsoft.com/office/drawing/2014/main" id="{1B15ED52-F352-441B-82BF-E0EA34836D08}"/>
@@ -4956,7 +4979,7 @@
       </p:sp>
       <p:sp>
         <p:nvSpPr>
-          <p:cNvPr id="12" name="Rectangle 11">
+          <p:cNvPr id="10" name="Rectangle 9">
             <a:extLst>
               <a:ext uri="{FF2B5EF4-FFF2-40B4-BE49-F238E27FC236}">
                 <a16:creationId xmlns:a16="http://schemas.microsoft.com/office/drawing/2014/main" id="{3B2E3793-BFE6-45A2-9B7B-E18844431C99}"/>
@@ -5029,7 +5052,7 @@
       </p:sp>
       <p:sp>
         <p:nvSpPr>
-          <p:cNvPr id="14" name="Rectangle 13">
+          <p:cNvPr id="12" name="Rectangle 11">
             <a:extLst>
               <a:ext uri="{FF2B5EF4-FFF2-40B4-BE49-F238E27FC236}">
                 <a16:creationId xmlns:a16="http://schemas.microsoft.com/office/drawing/2014/main" id="{BC4C4868-CB8F-4AF9-9CDB-8108F2C19B67}"/>
@@ -5105,7 +5128,7 @@
       </p:sp>
       <p:sp>
         <p:nvSpPr>
-          <p:cNvPr id="16" name="Rectangle 15">
+          <p:cNvPr id="14" name="Rectangle 13">
             <a:extLst>
               <a:ext uri="{FF2B5EF4-FFF2-40B4-BE49-F238E27FC236}">
                 <a16:creationId xmlns:a16="http://schemas.microsoft.com/office/drawing/2014/main" id="{375E0459-6403-40CD-989D-56A4407CA12E}"/>
@@ -5180,7 +5203,7 @@
       </p:sp>
       <p:sp>
         <p:nvSpPr>
-          <p:cNvPr id="18" name="Rectangle 17">
+          <p:cNvPr id="16" name="Rectangle 15">
             <a:extLst>
               <a:ext uri="{FF2B5EF4-FFF2-40B4-BE49-F238E27FC236}">
                 <a16:creationId xmlns:a16="http://schemas.microsoft.com/office/drawing/2014/main" id="{53E5B1A8-3AC9-4BD1-9BBC-78CA94F2D1BA}"/>
@@ -5259,7 +5282,7 @@
           <p:cNvPr id="2" name="Título 1">
             <a:extLst>
               <a:ext uri="{FF2B5EF4-FFF2-40B4-BE49-F238E27FC236}">
-                <a16:creationId xmlns:a16="http://schemas.microsoft.com/office/drawing/2014/main" id="{EF85517E-742F-4026-8637-95803F5A7D9D}"/>
+                <a16:creationId xmlns:a16="http://schemas.microsoft.com/office/drawing/2014/main" id="{4EF9A3A5-6056-4AC3-968B-7AC09CAFC15A}"/>
               </a:ext>
             </a:extLst>
           </p:cNvPr>
@@ -5285,20 +5308,138 @@
             <a:r>
               <a:rPr lang="pt-PT" sz="4000" b="1" dirty="0">
                 <a:solidFill>
+                  <a:srgbClr val="FFFFFF"/>
+                </a:solidFill>
+              </a:rPr>
+              <a:t>OAuth 2.0</a:t>
+            </a:r>
+          </a:p>
+        </p:txBody>
+      </p:sp>
+      <p:pic>
+        <p:nvPicPr>
+          <p:cNvPr id="9" name="Imagem 8" descr="Uma imagem com mesa&#10;&#10;Descrição gerada automaticamente">
+            <a:extLst>
+              <a:ext uri="{FF2B5EF4-FFF2-40B4-BE49-F238E27FC236}">
+                <a16:creationId xmlns:a16="http://schemas.microsoft.com/office/drawing/2014/main" id="{F0F88CF2-B2E7-42CF-9DDC-262E91197C32}"/>
+              </a:ext>
+            </a:extLst>
+          </p:cNvPr>
+          <p:cNvPicPr>
+            <a:picLocks noChangeAspect="1"/>
+          </p:cNvPicPr>
+          <p:nvPr/>
+        </p:nvPicPr>
+        <p:blipFill>
+          <a:blip r:embed="rId2">
+            <a:extLst>
+              <a:ext uri="{28A0092B-C50C-407E-A947-70E740481C1C}">
+                <a14:useLocalDpi xmlns:a14="http://schemas.microsoft.com/office/drawing/2010/main" val="0"/>
+              </a:ext>
+            </a:extLst>
+          </a:blip>
+          <a:stretch>
+            <a:fillRect/>
+          </a:stretch>
+        </p:blipFill>
+        <p:spPr>
+          <a:xfrm>
+            <a:off x="1274777" y="1639005"/>
+            <a:ext cx="9642446" cy="4543281"/>
+          </a:xfrm>
+          <a:prstGeom prst="rect">
+            <a:avLst/>
+          </a:prstGeom>
+        </p:spPr>
+      </p:pic>
+      <p:sp>
+        <p:nvSpPr>
+          <p:cNvPr id="11" name="CaixaDeTexto 10">
+            <a:extLst>
+              <a:ext uri="{FF2B5EF4-FFF2-40B4-BE49-F238E27FC236}">
+                <a16:creationId xmlns:a16="http://schemas.microsoft.com/office/drawing/2014/main" id="{E1D286D2-401C-49AB-9306-EA98AF708B52}"/>
+              </a:ext>
+            </a:extLst>
+          </p:cNvPr>
+          <p:cNvSpPr txBox="1"/>
+          <p:nvPr/>
+        </p:nvSpPr>
+        <p:spPr>
+          <a:xfrm>
+            <a:off x="7916778" y="2224756"/>
+            <a:ext cx="481264" cy="234000"/>
+          </a:xfrm>
+          <a:prstGeom prst="rect">
+            <a:avLst/>
+          </a:prstGeom>
+          <a:solidFill>
+            <a:schemeClr val="bg1"/>
+          </a:solidFill>
+        </p:spPr>
+        <p:txBody>
+          <a:bodyPr wrap="square" rtlCol="0">
+            <a:spAutoFit/>
+          </a:bodyPr>
+          <a:lstStyle/>
+          <a:p>
+            <a:r>
+              <a:rPr lang="pt-PT" dirty="0">
+                <a:solidFill>
                   <a:schemeClr val="bg1"/>
                 </a:solidFill>
               </a:rPr>
-              <a:t>OAuth em Aplicações Móveis</a:t>
+              <a:t>a</a:t>
+            </a:r>
+          </a:p>
+        </p:txBody>
+      </p:sp>
+      <p:sp>
+        <p:nvSpPr>
+          <p:cNvPr id="13" name="CaixaDeTexto 12">
+            <a:extLst>
+              <a:ext uri="{FF2B5EF4-FFF2-40B4-BE49-F238E27FC236}">
+                <a16:creationId xmlns:a16="http://schemas.microsoft.com/office/drawing/2014/main" id="{7E70F115-55AD-4A25-A12F-71BD1D44E97E}"/>
+              </a:ext>
+            </a:extLst>
+          </p:cNvPr>
+          <p:cNvSpPr txBox="1"/>
+          <p:nvPr/>
+        </p:nvSpPr>
+        <p:spPr>
+          <a:xfrm>
+            <a:off x="7916778" y="5287477"/>
+            <a:ext cx="481264" cy="234000"/>
+          </a:xfrm>
+          <a:prstGeom prst="rect">
+            <a:avLst/>
+          </a:prstGeom>
+          <a:solidFill>
+            <a:schemeClr val="bg1"/>
+          </a:solidFill>
+        </p:spPr>
+        <p:txBody>
+          <a:bodyPr wrap="square" rtlCol="0">
+            <a:spAutoFit/>
+          </a:bodyPr>
+          <a:lstStyle/>
+          <a:p>
+            <a:r>
+              <a:rPr lang="pt-PT" dirty="0">
+                <a:solidFill>
+                  <a:schemeClr val="bg1"/>
+                </a:solidFill>
+              </a:rPr>
+              <a:t>a</a:t>
             </a:r>
           </a:p>
         </p:txBody>
       </p:sp>
       <p:pic>
         <p:nvPicPr>
-          <p:cNvPr id="5" name="Picture 8" descr="CINTESIS - Investigação">
-            <a:extLst>
-              <a:ext uri="{FF2B5EF4-FFF2-40B4-BE49-F238E27FC236}">
-                <a16:creationId xmlns:a16="http://schemas.microsoft.com/office/drawing/2014/main" id="{0C37D708-E047-4DFC-99EB-D3DD6D4B61CB}"/>
+          <p:cNvPr id="15" name="Picture 8" descr="CINTESIS - Investigação">
+            <a:extLst>
+              <a:ext uri="{FF2B5EF4-FFF2-40B4-BE49-F238E27FC236}">
+                <a16:creationId xmlns:a16="http://schemas.microsoft.com/office/drawing/2014/main" id="{13F3CA60-D652-43B4-B7F0-6FE4BD0B7A06}"/>
               </a:ext>
             </a:extLst>
           </p:cNvPr>
@@ -5308,7 +5449,7 @@
           <p:nvPr/>
         </p:nvPicPr>
         <p:blipFill>
-          <a:blip r:embed="rId2">
+          <a:blip r:embed="rId3">
             <a:extLst>
               <a:ext uri="{28A0092B-C50C-407E-A947-70E740481C1C}">
                 <a14:useLocalDpi xmlns:a14="http://schemas.microsoft.com/office/drawing/2010/main" val="0"/>
@@ -5340,128 +5481,10 @@
           </a:extLst>
         </p:spPr>
       </p:pic>
-      <p:pic>
-        <p:nvPicPr>
-          <p:cNvPr id="11" name="Imagem 10" descr="Uma imagem com mesa&#10;&#10;Descrição gerada automaticamente">
-            <a:extLst>
-              <a:ext uri="{FF2B5EF4-FFF2-40B4-BE49-F238E27FC236}">
-                <a16:creationId xmlns:a16="http://schemas.microsoft.com/office/drawing/2014/main" id="{DF998DB3-D6C0-4BD1-894E-C7C287BA2059}"/>
-              </a:ext>
-            </a:extLst>
-          </p:cNvPr>
-          <p:cNvPicPr>
-            <a:picLocks noChangeAspect="1"/>
-          </p:cNvPicPr>
-          <p:nvPr/>
-        </p:nvPicPr>
-        <p:blipFill>
-          <a:blip r:embed="rId3">
-            <a:extLst>
-              <a:ext uri="{28A0092B-C50C-407E-A947-70E740481C1C}">
-                <a14:useLocalDpi xmlns:a14="http://schemas.microsoft.com/office/drawing/2010/main" val="0"/>
-              </a:ext>
-            </a:extLst>
-          </a:blip>
-          <a:stretch>
-            <a:fillRect/>
-          </a:stretch>
-        </p:blipFill>
-        <p:spPr>
-          <a:xfrm>
-            <a:off x="1366828" y="1590741"/>
-            <a:ext cx="9453572" cy="5081170"/>
-          </a:xfrm>
-          <a:prstGeom prst="rect">
-            <a:avLst/>
-          </a:prstGeom>
-        </p:spPr>
-      </p:pic>
-      <p:sp>
-        <p:nvSpPr>
-          <p:cNvPr id="13" name="CaixaDeTexto 12">
-            <a:extLst>
-              <a:ext uri="{FF2B5EF4-FFF2-40B4-BE49-F238E27FC236}">
-                <a16:creationId xmlns:a16="http://schemas.microsoft.com/office/drawing/2014/main" id="{D433DA40-A91A-4863-96F7-A7958191FC7F}"/>
-              </a:ext>
-            </a:extLst>
-          </p:cNvPr>
-          <p:cNvSpPr txBox="1"/>
-          <p:nvPr/>
-        </p:nvSpPr>
-        <p:spPr>
-          <a:xfrm>
-            <a:off x="7994603" y="2131077"/>
-            <a:ext cx="481264" cy="234000"/>
-          </a:xfrm>
-          <a:prstGeom prst="rect">
-            <a:avLst/>
-          </a:prstGeom>
-          <a:solidFill>
-            <a:schemeClr val="bg1"/>
-          </a:solidFill>
-        </p:spPr>
-        <p:txBody>
-          <a:bodyPr wrap="square" rtlCol="0">
-            <a:spAutoFit/>
-          </a:bodyPr>
-          <a:lstStyle/>
-          <a:p>
-            <a:r>
-              <a:rPr lang="pt-PT" dirty="0">
-                <a:solidFill>
-                  <a:schemeClr val="bg1"/>
-                </a:solidFill>
-              </a:rPr>
-              <a:t>a</a:t>
-            </a:r>
-          </a:p>
-        </p:txBody>
-      </p:sp>
-      <p:sp>
-        <p:nvSpPr>
-          <p:cNvPr id="15" name="CaixaDeTexto 14">
-            <a:extLst>
-              <a:ext uri="{FF2B5EF4-FFF2-40B4-BE49-F238E27FC236}">
-                <a16:creationId xmlns:a16="http://schemas.microsoft.com/office/drawing/2014/main" id="{CA96252C-158A-4BF1-B06F-AC4F6C1B15A9}"/>
-              </a:ext>
-            </a:extLst>
-          </p:cNvPr>
-          <p:cNvSpPr txBox="1"/>
-          <p:nvPr/>
-        </p:nvSpPr>
-        <p:spPr>
-          <a:xfrm>
-            <a:off x="7994603" y="5836804"/>
-            <a:ext cx="481264" cy="234000"/>
-          </a:xfrm>
-          <a:prstGeom prst="rect">
-            <a:avLst/>
-          </a:prstGeom>
-          <a:solidFill>
-            <a:schemeClr val="bg1"/>
-          </a:solidFill>
-        </p:spPr>
-        <p:txBody>
-          <a:bodyPr wrap="square" rtlCol="0">
-            <a:spAutoFit/>
-          </a:bodyPr>
-          <a:lstStyle/>
-          <a:p>
-            <a:r>
-              <a:rPr lang="pt-PT" dirty="0">
-                <a:solidFill>
-                  <a:schemeClr val="bg1"/>
-                </a:solidFill>
-              </a:rPr>
-              <a:t>a</a:t>
-            </a:r>
-          </a:p>
-        </p:txBody>
-      </p:sp>
     </p:spTree>
     <p:extLst>
       <p:ext uri="{BB962C8B-B14F-4D97-AF65-F5344CB8AC3E}">
-        <p14:creationId xmlns:p14="http://schemas.microsoft.com/office/powerpoint/2010/main" val="849255015"/>
+        <p14:creationId xmlns:p14="http://schemas.microsoft.com/office/powerpoint/2010/main" val="144438322"/>
       </p:ext>
     </p:extLst>
   </p:cSld>
@@ -5498,7 +5521,7 @@
       </p:grpSpPr>
       <p:sp useBgFill="1">
         <p:nvSpPr>
-          <p:cNvPr id="8" name="Rectangle 7">
+          <p:cNvPr id="10" name="Rectangle 9">
             <a:extLst>
               <a:ext uri="{FF2B5EF4-FFF2-40B4-BE49-F238E27FC236}">
                 <a16:creationId xmlns:a16="http://schemas.microsoft.com/office/drawing/2014/main" id="{1B15ED52-F352-441B-82BF-E0EA34836D08}"/>
@@ -5574,7 +5597,7 @@
       </p:sp>
       <p:sp>
         <p:nvSpPr>
-          <p:cNvPr id="10" name="Rectangle 9">
+          <p:cNvPr id="12" name="Rectangle 11">
             <a:extLst>
               <a:ext uri="{FF2B5EF4-FFF2-40B4-BE49-F238E27FC236}">
                 <a16:creationId xmlns:a16="http://schemas.microsoft.com/office/drawing/2014/main" id="{3B2E3793-BFE6-45A2-9B7B-E18844431C99}"/>
@@ -5647,7 +5670,7 @@
       </p:sp>
       <p:sp>
         <p:nvSpPr>
-          <p:cNvPr id="12" name="Rectangle 11">
+          <p:cNvPr id="14" name="Rectangle 13">
             <a:extLst>
               <a:ext uri="{FF2B5EF4-FFF2-40B4-BE49-F238E27FC236}">
                 <a16:creationId xmlns:a16="http://schemas.microsoft.com/office/drawing/2014/main" id="{BC4C4868-CB8F-4AF9-9CDB-8108F2C19B67}"/>
@@ -5723,7 +5746,7 @@
       </p:sp>
       <p:sp>
         <p:nvSpPr>
-          <p:cNvPr id="14" name="Rectangle 13">
+          <p:cNvPr id="16" name="Rectangle 15">
             <a:extLst>
               <a:ext uri="{FF2B5EF4-FFF2-40B4-BE49-F238E27FC236}">
                 <a16:creationId xmlns:a16="http://schemas.microsoft.com/office/drawing/2014/main" id="{375E0459-6403-40CD-989D-56A4407CA12E}"/>
@@ -5798,7 +5821,7 @@
       </p:sp>
       <p:sp>
         <p:nvSpPr>
-          <p:cNvPr id="16" name="Rectangle 15">
+          <p:cNvPr id="18" name="Rectangle 17">
             <a:extLst>
               <a:ext uri="{FF2B5EF4-FFF2-40B4-BE49-F238E27FC236}">
                 <a16:creationId xmlns:a16="http://schemas.microsoft.com/office/drawing/2014/main" id="{53E5B1A8-3AC9-4BD1-9BBC-78CA94F2D1BA}"/>
@@ -5877,7 +5900,7 @@
           <p:cNvPr id="2" name="Título 1">
             <a:extLst>
               <a:ext uri="{FF2B5EF4-FFF2-40B4-BE49-F238E27FC236}">
-                <a16:creationId xmlns:a16="http://schemas.microsoft.com/office/drawing/2014/main" id="{94C7A8FE-17B1-4D7D-B0F1-F36EDBB388D6}"/>
+                <a16:creationId xmlns:a16="http://schemas.microsoft.com/office/drawing/2014/main" id="{EF85517E-742F-4026-8637-95803F5A7D9D}"/>
               </a:ext>
             </a:extLst>
           </p:cNvPr>
@@ -5900,199 +5923,921 @@
           </a:bodyPr>
           <a:lstStyle/>
           <a:p>
+            <a:r>
+              <a:rPr lang="pt-PT" sz="4000" b="1" dirty="0" err="1">
+                <a:solidFill>
+                  <a:srgbClr val="FFFFFF"/>
+                </a:solidFill>
+              </a:rPr>
+              <a:t>OpenID</a:t>
+            </a:r>
             <a:r>
               <a:rPr lang="pt-PT" sz="4000" b="1" dirty="0">
                 <a:solidFill>
                   <a:srgbClr val="FFFFFF"/>
                 </a:solidFill>
               </a:rPr>
-              <a:t>Terminologias</a:t>
-            </a:r>
-          </a:p>
-        </p:txBody>
-      </p:sp>
-      <p:sp>
-        <p:nvSpPr>
-          <p:cNvPr id="3" name="Marcador de Posição de Conteúdo 2">
-            <a:extLst>
-              <a:ext uri="{FF2B5EF4-FFF2-40B4-BE49-F238E27FC236}">
-                <a16:creationId xmlns:a16="http://schemas.microsoft.com/office/drawing/2014/main" id="{C96F46EC-4830-414E-9E9D-240B7C3E04E7}"/>
-              </a:ext>
-            </a:extLst>
-          </p:cNvPr>
-          <p:cNvSpPr>
-            <a:spLocks noGrp="1"/>
-          </p:cNvSpPr>
-          <p:nvPr>
-            <p:ph idx="1"/>
-          </p:nvPr>
-        </p:nvSpPr>
+              <a:t> </a:t>
+            </a:r>
+            <a:r>
+              <a:rPr lang="pt-PT" sz="4000" b="1" dirty="0" err="1">
+                <a:solidFill>
+                  <a:srgbClr val="FFFFFF"/>
+                </a:solidFill>
+              </a:rPr>
+              <a:t>Connect</a:t>
+            </a:r>
+            <a:endParaRPr lang="pt-PT" sz="4000" b="1" dirty="0">
+              <a:solidFill>
+                <a:srgbClr val="FFFFFF"/>
+              </a:solidFill>
+            </a:endParaRPr>
+          </a:p>
+        </p:txBody>
+      </p:sp>
+      <p:pic>
+        <p:nvPicPr>
+          <p:cNvPr id="5" name="Picture 8" descr="CINTESIS - Investigação">
+            <a:extLst>
+              <a:ext uri="{FF2B5EF4-FFF2-40B4-BE49-F238E27FC236}">
+                <a16:creationId xmlns:a16="http://schemas.microsoft.com/office/drawing/2014/main" id="{0C37D708-E047-4DFC-99EB-D3DD6D4B61CB}"/>
+              </a:ext>
+            </a:extLst>
+          </p:cNvPr>
+          <p:cNvPicPr>
+            <a:picLocks noChangeAspect="1" noChangeArrowheads="1"/>
+          </p:cNvPicPr>
+          <p:nvPr/>
+        </p:nvPicPr>
+        <p:blipFill>
+          <a:blip r:embed="rId2">
+            <a:extLst>
+              <a:ext uri="{28A0092B-C50C-407E-A947-70E740481C1C}">
+                <a14:useLocalDpi xmlns:a14="http://schemas.microsoft.com/office/drawing/2010/main" val="0"/>
+              </a:ext>
+            </a:extLst>
+          </a:blip>
+          <a:srcRect/>
+          <a:stretch>
+            <a:fillRect/>
+          </a:stretch>
+        </p:blipFill>
+        <p:spPr bwMode="auto">
+          <a:xfrm>
+            <a:off x="10820400" y="6172200"/>
+            <a:ext cx="1371600" cy="685800"/>
+          </a:xfrm>
+          <a:prstGeom prst="rect">
+            <a:avLst/>
+          </a:prstGeom>
+          <a:noFill/>
+          <a:extLst>
+            <a:ext uri="{909E8E84-426E-40DD-AFC4-6F175D3DCCD1}">
+              <a14:hiddenFill xmlns:a14="http://schemas.microsoft.com/office/drawing/2010/main">
+                <a:solidFill>
+                  <a:srgbClr val="FFFFFF"/>
+                </a:solidFill>
+              </a14:hiddenFill>
+            </a:ext>
+          </a:extLst>
+        </p:spPr>
+      </p:pic>
+      <p:pic>
+        <p:nvPicPr>
+          <p:cNvPr id="20" name="Imagem 19" descr="Uma imagem com mesa&#10;&#10;Descrição gerada automaticamente">
+            <a:extLst>
+              <a:ext uri="{FF2B5EF4-FFF2-40B4-BE49-F238E27FC236}">
+                <a16:creationId xmlns:a16="http://schemas.microsoft.com/office/drawing/2014/main" id="{BDBB35EF-A977-477B-A98A-8DC2309DDC48}"/>
+              </a:ext>
+            </a:extLst>
+          </p:cNvPr>
+          <p:cNvPicPr>
+            <a:picLocks noChangeAspect="1"/>
+          </p:cNvPicPr>
+          <p:nvPr/>
+        </p:nvPicPr>
+        <p:blipFill>
+          <a:blip r:embed="rId3">
+            <a:extLst>
+              <a:ext uri="{28A0092B-C50C-407E-A947-70E740481C1C}">
+                <a14:useLocalDpi xmlns:a14="http://schemas.microsoft.com/office/drawing/2010/main" val="0"/>
+              </a:ext>
+            </a:extLst>
+          </a:blip>
+          <a:stretch>
+            <a:fillRect/>
+          </a:stretch>
+        </p:blipFill>
         <p:spPr>
           <a:xfrm>
-            <a:off x="1371599" y="2021305"/>
-            <a:ext cx="9724031" cy="3980250"/>
-          </a:xfrm>
-        </p:spPr>
-        <p:txBody>
-          <a:bodyPr anchor="ctr">
-            <a:normAutofit/>
+            <a:off x="1274777" y="1628919"/>
+            <a:ext cx="9642446" cy="4543281"/>
+          </a:xfrm>
+          <a:prstGeom prst="rect">
+            <a:avLst/>
+          </a:prstGeom>
+        </p:spPr>
+      </p:pic>
+      <p:sp>
+        <p:nvSpPr>
+          <p:cNvPr id="21" name="CaixaDeTexto 20">
+            <a:extLst>
+              <a:ext uri="{FF2B5EF4-FFF2-40B4-BE49-F238E27FC236}">
+                <a16:creationId xmlns:a16="http://schemas.microsoft.com/office/drawing/2014/main" id="{17846D42-A81F-4C5B-8D4F-62A50F40C97F}"/>
+              </a:ext>
+            </a:extLst>
+          </p:cNvPr>
+          <p:cNvSpPr txBox="1"/>
+          <p:nvPr/>
+        </p:nvSpPr>
+        <p:spPr>
+          <a:xfrm>
+            <a:off x="6545179" y="2636861"/>
+            <a:ext cx="1764632" cy="276999"/>
+          </a:xfrm>
+          <a:prstGeom prst="rect">
+            <a:avLst/>
+          </a:prstGeom>
+          <a:noFill/>
+        </p:spPr>
+        <p:txBody>
+          <a:bodyPr wrap="square" rtlCol="0">
+            <a:spAutoFit/>
           </a:bodyPr>
           <a:lstStyle/>
           <a:p>
             <a:r>
-              <a:rPr lang="pt-PT" sz="2000" b="1" dirty="0" err="1"/>
-              <a:t>Resource</a:t>
-            </a:r>
-            <a:r>
-              <a:rPr lang="pt-PT" sz="2000" b="1" dirty="0"/>
+              <a:rPr lang="pt-PT" sz="1200" b="1" dirty="0"/>
+              <a:t>&amp; scope = </a:t>
+            </a:r>
+            <a:r>
+              <a:rPr lang="pt-PT" sz="1200" b="1" dirty="0" err="1"/>
+              <a:t>openid</a:t>
+            </a:r>
+            <a:r>
+              <a:rPr lang="pt-PT" sz="1200" b="1" dirty="0"/>
               <a:t> </a:t>
             </a:r>
             <a:r>
-              <a:rPr lang="pt-PT" sz="2000" b="1" dirty="0" err="1"/>
-              <a:t>Owner</a:t>
-            </a:r>
-            <a:r>
-              <a:rPr lang="pt-PT" sz="2000" b="1" dirty="0"/>
-              <a:t> – </a:t>
-            </a:r>
-            <a:r>
-              <a:rPr lang="pt-PT" sz="2000" dirty="0"/>
-              <a:t>Utilizador</a:t>
-            </a:r>
-          </a:p>
-          <a:p>
-            <a:r>
-              <a:rPr lang="pt-PT" sz="2000" b="1" dirty="0"/>
-              <a:t>Web App – </a:t>
-            </a:r>
-            <a:r>
-              <a:rPr lang="pt-PT" sz="2000" dirty="0"/>
-              <a:t>Aplicação que está a tentar aceder aos dados</a:t>
-            </a:r>
-          </a:p>
-          <a:p>
-            <a:r>
-              <a:rPr lang="pt-PT" sz="2000" b="1" dirty="0" err="1"/>
-              <a:t>Authorization</a:t>
-            </a:r>
-            <a:r>
-              <a:rPr lang="pt-PT" sz="2000" b="1" dirty="0"/>
-              <a:t> Server – </a:t>
-            </a:r>
-            <a:r>
-              <a:rPr lang="pt-PT" sz="2000" dirty="0"/>
-              <a:t>Servidor de autorização</a:t>
-            </a:r>
-          </a:p>
-          <a:p>
-            <a:r>
-              <a:rPr lang="pt-PT" sz="2000" b="1" dirty="0" err="1"/>
-              <a:t>Resource</a:t>
-            </a:r>
-            <a:r>
-              <a:rPr lang="pt-PT" sz="2000" b="1" dirty="0"/>
-              <a:t> Server – </a:t>
-            </a:r>
-            <a:r>
-              <a:rPr lang="pt-PT" sz="2000" dirty="0"/>
-              <a:t>Servidor que contém os dados do Utilizador</a:t>
-            </a:r>
-          </a:p>
-          <a:p>
-            <a:r>
-              <a:rPr lang="pt-PT" sz="2000" b="1" dirty="0" err="1"/>
-              <a:t>Authorization</a:t>
-            </a:r>
-            <a:r>
-              <a:rPr lang="pt-PT" sz="2000" b="1" dirty="0"/>
-              <a:t> Grant – </a:t>
-            </a:r>
-            <a:r>
-              <a:rPr lang="pt-PT" sz="2000" dirty="0"/>
-              <a:t>Pedido de permissões para o Utilizador aceitar ou recusar</a:t>
-            </a:r>
-          </a:p>
-          <a:p>
-            <a:r>
-              <a:rPr lang="pt-PT" sz="2000" b="1" dirty="0"/>
-              <a:t>Access </a:t>
-            </a:r>
-            <a:r>
-              <a:rPr lang="pt-PT" sz="2000" b="1" dirty="0" err="1"/>
-              <a:t>Token</a:t>
-            </a:r>
-            <a:r>
-              <a:rPr lang="pt-PT" sz="2000" b="1" dirty="0"/>
-              <a:t> – </a:t>
-            </a:r>
-            <a:r>
-              <a:rPr lang="pt-PT" sz="2000" dirty="0" err="1"/>
-              <a:t>Token</a:t>
-            </a:r>
-            <a:r>
-              <a:rPr lang="pt-PT" sz="2000" dirty="0"/>
-              <a:t> de acesso aos dados</a:t>
-            </a:r>
-          </a:p>
-          <a:p>
-            <a:r>
-              <a:rPr lang="pt-PT" sz="2000" b="1" dirty="0"/>
-              <a:t>ID </a:t>
-            </a:r>
-            <a:r>
-              <a:rPr lang="pt-PT" sz="2000" b="1" dirty="0" err="1"/>
-              <a:t>Token</a:t>
-            </a:r>
-            <a:r>
-              <a:rPr lang="pt-PT" sz="2000" b="1" dirty="0"/>
-              <a:t> – </a:t>
-            </a:r>
-            <a:r>
-              <a:rPr lang="pt-PT" sz="2000" dirty="0" err="1"/>
-              <a:t>Token</a:t>
-            </a:r>
-            <a:r>
-              <a:rPr lang="pt-PT" sz="2000" dirty="0"/>
-              <a:t> para autenticação</a:t>
-            </a:r>
-          </a:p>
-          <a:p>
-            <a:r>
-              <a:rPr lang="pt-PT" sz="2000" b="1" dirty="0"/>
-              <a:t>PKCE – </a:t>
-            </a:r>
-            <a:r>
-              <a:rPr lang="pt-PT" sz="2000" dirty="0" err="1"/>
-              <a:t>Proof</a:t>
-            </a:r>
-            <a:r>
-              <a:rPr lang="pt-PT" sz="2000" dirty="0"/>
-              <a:t> </a:t>
-            </a:r>
-            <a:r>
-              <a:rPr lang="pt-PT" sz="2000" dirty="0" err="1"/>
-              <a:t>Key</a:t>
-            </a:r>
-            <a:r>
-              <a:rPr lang="pt-PT" sz="2000" dirty="0"/>
-              <a:t> for </a:t>
-            </a:r>
-            <a:r>
-              <a:rPr lang="pt-PT" sz="2000" dirty="0" err="1"/>
-              <a:t>Code</a:t>
-            </a:r>
-            <a:r>
-              <a:rPr lang="pt-PT" sz="2000" dirty="0"/>
-              <a:t> Exchange</a:t>
-            </a:r>
-            <a:endParaRPr lang="pt-PT" sz="2000" b="1" dirty="0"/>
+              <a:rPr lang="pt-PT" sz="1200" b="1" dirty="0" err="1"/>
+              <a:t>profile</a:t>
+            </a:r>
+            <a:endParaRPr lang="pt-PT" sz="1200" b="1" dirty="0"/>
+          </a:p>
+        </p:txBody>
+      </p:sp>
+      <p:sp>
+        <p:nvSpPr>
+          <p:cNvPr id="22" name="CaixaDeTexto 21">
+            <a:extLst>
+              <a:ext uri="{FF2B5EF4-FFF2-40B4-BE49-F238E27FC236}">
+                <a16:creationId xmlns:a16="http://schemas.microsoft.com/office/drawing/2014/main" id="{F318E3F6-6C43-46F3-BC08-1CCDE8722F39}"/>
+              </a:ext>
+            </a:extLst>
+          </p:cNvPr>
+          <p:cNvSpPr txBox="1"/>
+          <p:nvPr/>
+        </p:nvSpPr>
+        <p:spPr>
+          <a:xfrm>
+            <a:off x="6866021" y="4192945"/>
+            <a:ext cx="1764632" cy="276999"/>
+          </a:xfrm>
+          <a:prstGeom prst="rect">
+            <a:avLst/>
+          </a:prstGeom>
+          <a:noFill/>
+        </p:spPr>
+        <p:txBody>
+          <a:bodyPr wrap="square" rtlCol="0">
+            <a:spAutoFit/>
+          </a:bodyPr>
+          <a:lstStyle/>
+          <a:p>
+            <a:r>
+              <a:rPr lang="pt-PT" sz="1200" b="1" dirty="0"/>
+              <a:t>&amp; ID </a:t>
+            </a:r>
+            <a:r>
+              <a:rPr lang="pt-PT" sz="1200" b="1" dirty="0" err="1"/>
+              <a:t>token</a:t>
+            </a:r>
+            <a:endParaRPr lang="pt-PT" sz="1200" b="1" dirty="0"/>
+          </a:p>
+        </p:txBody>
+      </p:sp>
+      <p:sp>
+        <p:nvSpPr>
+          <p:cNvPr id="23" name="CaixaDeTexto 22">
+            <a:extLst>
+              <a:ext uri="{FF2B5EF4-FFF2-40B4-BE49-F238E27FC236}">
+                <a16:creationId xmlns:a16="http://schemas.microsoft.com/office/drawing/2014/main" id="{330D7B9E-57C1-4B3D-ADF3-FCD5EA479F00}"/>
+              </a:ext>
+            </a:extLst>
+          </p:cNvPr>
+          <p:cNvSpPr txBox="1"/>
+          <p:nvPr/>
+        </p:nvSpPr>
+        <p:spPr>
+          <a:xfrm>
+            <a:off x="7916778" y="2190607"/>
+            <a:ext cx="481264" cy="234000"/>
+          </a:xfrm>
+          <a:prstGeom prst="rect">
+            <a:avLst/>
+          </a:prstGeom>
+          <a:solidFill>
+            <a:schemeClr val="bg1"/>
+          </a:solidFill>
+        </p:spPr>
+        <p:txBody>
+          <a:bodyPr wrap="square" rtlCol="0">
+            <a:spAutoFit/>
+          </a:bodyPr>
+          <a:lstStyle/>
+          <a:p>
+            <a:r>
+              <a:rPr lang="pt-PT" dirty="0">
+                <a:solidFill>
+                  <a:schemeClr val="bg1"/>
+                </a:solidFill>
+              </a:rPr>
+              <a:t>a</a:t>
+            </a:r>
+          </a:p>
+        </p:txBody>
+      </p:sp>
+      <p:sp>
+        <p:nvSpPr>
+          <p:cNvPr id="24" name="CaixaDeTexto 23">
+            <a:extLst>
+              <a:ext uri="{FF2B5EF4-FFF2-40B4-BE49-F238E27FC236}">
+                <a16:creationId xmlns:a16="http://schemas.microsoft.com/office/drawing/2014/main" id="{5897A743-578C-4A78-AC28-0659E0A5C8EF}"/>
+              </a:ext>
+            </a:extLst>
+          </p:cNvPr>
+          <p:cNvSpPr txBox="1"/>
+          <p:nvPr/>
+        </p:nvSpPr>
+        <p:spPr>
+          <a:xfrm>
+            <a:off x="7916778" y="5253056"/>
+            <a:ext cx="481264" cy="234000"/>
+          </a:xfrm>
+          <a:prstGeom prst="rect">
+            <a:avLst/>
+          </a:prstGeom>
+          <a:solidFill>
+            <a:schemeClr val="bg1"/>
+          </a:solidFill>
+        </p:spPr>
+        <p:txBody>
+          <a:bodyPr wrap="square" rtlCol="0">
+            <a:spAutoFit/>
+          </a:bodyPr>
+          <a:lstStyle/>
+          <a:p>
+            <a:r>
+              <a:rPr lang="pt-PT" dirty="0">
+                <a:solidFill>
+                  <a:schemeClr val="bg1"/>
+                </a:solidFill>
+              </a:rPr>
+              <a:t>a</a:t>
+            </a:r>
           </a:p>
         </p:txBody>
       </p:sp>
     </p:spTree>
     <p:extLst>
       <p:ext uri="{BB962C8B-B14F-4D97-AF65-F5344CB8AC3E}">
-        <p14:creationId xmlns:p14="http://schemas.microsoft.com/office/powerpoint/2010/main" val="67633509"/>
+        <p14:creationId xmlns:p14="http://schemas.microsoft.com/office/powerpoint/2010/main" val="2977591242"/>
+      </p:ext>
+    </p:extLst>
+  </p:cSld>
+  <p:clrMapOvr>
+    <a:masterClrMapping/>
+  </p:clrMapOvr>
+</p:sld>
+</file>
+
+<file path=ppt/slides/slide6.xml><?xml version="1.0" encoding="utf-8"?>
+<p:sld xmlns:a="http://schemas.openxmlformats.org/drawingml/2006/main" xmlns:r="http://schemas.openxmlformats.org/officeDocument/2006/relationships" xmlns:p="http://schemas.openxmlformats.org/presentationml/2006/main">
+  <p:cSld>
+    <p:bg>
+      <p:bgPr>
+        <a:solidFill>
+          <a:schemeClr val="bg1"/>
+        </a:solidFill>
+        <a:effectLst/>
+      </p:bgPr>
+    </p:bg>
+    <p:spTree>
+      <p:nvGrpSpPr>
+        <p:cNvPr id="1" name=""/>
+        <p:cNvGrpSpPr/>
+        <p:nvPr/>
+      </p:nvGrpSpPr>
+      <p:grpSpPr>
+        <a:xfrm>
+          <a:off x="0" y="0"/>
+          <a:ext cx="0" cy="0"/>
+          <a:chOff x="0" y="0"/>
+          <a:chExt cx="0" cy="0"/>
+        </a:xfrm>
+      </p:grpSpPr>
+      <p:sp useBgFill="1">
+        <p:nvSpPr>
+          <p:cNvPr id="10" name="Rectangle 9">
+            <a:extLst>
+              <a:ext uri="{FF2B5EF4-FFF2-40B4-BE49-F238E27FC236}">
+                <a16:creationId xmlns:a16="http://schemas.microsoft.com/office/drawing/2014/main" id="{1B15ED52-F352-441B-82BF-E0EA34836D08}"/>
+              </a:ext>
+              <a:ext uri="{C183D7F6-B498-43B3-948B-1728B52AA6E4}">
+                <adec:decorative xmlns:adec="http://schemas.microsoft.com/office/drawing/2017/decorative" val="1"/>
+              </a:ext>
+            </a:extLst>
+          </p:cNvPr>
+          <p:cNvSpPr>
+            <a:spLocks noGrp="1" noRot="1" noChangeAspect="1" noMove="1" noResize="1" noEditPoints="1" noAdjustHandles="1" noChangeArrowheads="1" noChangeShapeType="1" noTextEdit="1"/>
+          </p:cNvSpPr>
+          <p:nvPr>
+            <p:extLst>
+              <p:ext uri="{386F3935-93C4-4BCD-93E2-E3B085C9AB24}">
+                <p16:designElem xmlns:p16="http://schemas.microsoft.com/office/powerpoint/2015/main" val="1"/>
+              </p:ext>
+            </p:extLst>
+          </p:nvPr>
+        </p:nvSpPr>
+        <p:spPr>
+          <a:xfrm>
+            <a:off x="0" y="0"/>
+            <a:ext cx="12192000" cy="6858000"/>
+          </a:xfrm>
+          <a:prstGeom prst="rect">
+            <a:avLst/>
+          </a:prstGeom>
+          <a:ln w="12700" cap="flat" cmpd="sng" algn="ctr">
+            <a:noFill/>
+            <a:prstDash val="solid"/>
+            <a:miter lim="800000"/>
+          </a:ln>
+          <a:effectLst/>
+          <a:extLst>
+            <a:ext uri="{91240B29-F687-4F45-9708-019B960494DF}">
+              <a14:hiddenLine xmlns:a14="http://schemas.microsoft.com/office/drawing/2010/main" w="12700" cap="flat" cmpd="sng" algn="ctr">
+                <a:solidFill>
+                  <a:schemeClr val="accent1">
+                    <a:shade val="50000"/>
+                  </a:schemeClr>
+                </a:solidFill>
+                <a:prstDash val="solid"/>
+                <a:miter lim="800000"/>
+              </a14:hiddenLine>
+            </a:ext>
+          </a:extLst>
+        </p:spPr>
+        <p:style>
+          <a:lnRef idx="2">
+            <a:schemeClr val="accent1">
+              <a:shade val="50000"/>
+            </a:schemeClr>
+          </a:lnRef>
+          <a:fillRef idx="1">
+            <a:schemeClr val="accent1"/>
+          </a:fillRef>
+          <a:effectRef idx="0">
+            <a:schemeClr val="accent1"/>
+          </a:effectRef>
+          <a:fontRef idx="minor">
+            <a:schemeClr val="lt1"/>
+          </a:fontRef>
+        </p:style>
+        <p:txBody>
+          <a:bodyPr rtlCol="0" anchor="ctr"/>
+          <a:lstStyle/>
+          <a:p>
+            <a:pPr algn="ctr"/>
+            <a:endParaRPr lang="en-US"/>
+          </a:p>
+        </p:txBody>
+      </p:sp>
+      <p:sp>
+        <p:nvSpPr>
+          <p:cNvPr id="12" name="Rectangle 11">
+            <a:extLst>
+              <a:ext uri="{FF2B5EF4-FFF2-40B4-BE49-F238E27FC236}">
+                <a16:creationId xmlns:a16="http://schemas.microsoft.com/office/drawing/2014/main" id="{3B2E3793-BFE6-45A2-9B7B-E18844431C99}"/>
+              </a:ext>
+              <a:ext uri="{C183D7F6-B498-43B3-948B-1728B52AA6E4}">
+                <adec:decorative xmlns:adec="http://schemas.microsoft.com/office/drawing/2017/decorative" val="1"/>
+              </a:ext>
+            </a:extLst>
+          </p:cNvPr>
+          <p:cNvSpPr>
+            <a:spLocks noGrp="1" noRot="1" noChangeAspect="1" noMove="1" noResize="1" noEditPoints="1" noAdjustHandles="1" noChangeArrowheads="1" noChangeShapeType="1" noTextEdit="1"/>
+          </p:cNvSpPr>
+          <p:nvPr>
+            <p:extLst>
+              <p:ext uri="{386F3935-93C4-4BCD-93E2-E3B085C9AB24}">
+                <p16:designElem xmlns:p16="http://schemas.microsoft.com/office/powerpoint/2015/main" val="1"/>
+              </p:ext>
+            </p:extLst>
+          </p:nvPr>
+        </p:nvSpPr>
+        <p:spPr>
+          <a:xfrm flipH="1">
+            <a:off x="-1" y="-1"/>
+            <a:ext cx="12191998" cy="1590742"/>
+          </a:xfrm>
+          <a:prstGeom prst="rect">
+            <a:avLst/>
+          </a:prstGeom>
+          <a:gradFill>
+            <a:gsLst>
+              <a:gs pos="0">
+                <a:srgbClr val="000000"/>
+              </a:gs>
+              <a:gs pos="100000">
+                <a:schemeClr val="accent1">
+                  <a:lumMod val="75000"/>
+                </a:schemeClr>
+              </a:gs>
+            </a:gsLst>
+            <a:lin ang="8400000" scaled="0"/>
+          </a:gradFill>
+          <a:ln>
+            <a:noFill/>
+          </a:ln>
+        </p:spPr>
+        <p:style>
+          <a:lnRef idx="2">
+            <a:schemeClr val="accent1">
+              <a:shade val="50000"/>
+            </a:schemeClr>
+          </a:lnRef>
+          <a:fillRef idx="1">
+            <a:schemeClr val="accent1"/>
+          </a:fillRef>
+          <a:effectRef idx="0">
+            <a:schemeClr val="accent1"/>
+          </a:effectRef>
+          <a:fontRef idx="minor">
+            <a:schemeClr val="lt1"/>
+          </a:fontRef>
+        </p:style>
+        <p:txBody>
+          <a:bodyPr rtlCol="0" anchor="ctr"/>
+          <a:lstStyle/>
+          <a:p>
+            <a:pPr algn="ctr"/>
+            <a:endParaRPr lang="en-US"/>
+          </a:p>
+        </p:txBody>
+      </p:sp>
+      <p:sp>
+        <p:nvSpPr>
+          <p:cNvPr id="14" name="Rectangle 13">
+            <a:extLst>
+              <a:ext uri="{FF2B5EF4-FFF2-40B4-BE49-F238E27FC236}">
+                <a16:creationId xmlns:a16="http://schemas.microsoft.com/office/drawing/2014/main" id="{BC4C4868-CB8F-4AF9-9CDB-8108F2C19B67}"/>
+              </a:ext>
+              <a:ext uri="{C183D7F6-B498-43B3-948B-1728B52AA6E4}">
+                <adec:decorative xmlns:adec="http://schemas.microsoft.com/office/drawing/2017/decorative" val="1"/>
+              </a:ext>
+            </a:extLst>
+          </p:cNvPr>
+          <p:cNvSpPr>
+            <a:spLocks noGrp="1" noRot="1" noChangeAspect="1" noMove="1" noResize="1" noEditPoints="1" noAdjustHandles="1" noChangeArrowheads="1" noChangeShapeType="1" noTextEdit="1"/>
+          </p:cNvSpPr>
+          <p:nvPr>
+            <p:extLst>
+              <p:ext uri="{386F3935-93C4-4BCD-93E2-E3B085C9AB24}">
+                <p16:designElem xmlns:p16="http://schemas.microsoft.com/office/powerpoint/2015/main" val="1"/>
+              </p:ext>
+            </p:extLst>
+          </p:nvPr>
+        </p:nvSpPr>
+        <p:spPr>
+          <a:xfrm rot="10800000" flipH="1">
+            <a:off x="-3" y="0"/>
+            <a:ext cx="8115306" cy="1590742"/>
+          </a:xfrm>
+          <a:prstGeom prst="rect">
+            <a:avLst/>
+          </a:prstGeom>
+          <a:gradFill>
+            <a:gsLst>
+              <a:gs pos="20000">
+                <a:schemeClr val="accent1">
+                  <a:alpha val="0"/>
+                </a:schemeClr>
+              </a:gs>
+              <a:gs pos="100000">
+                <a:schemeClr val="accent1">
+                  <a:lumMod val="50000"/>
+                  <a:alpha val="55000"/>
+                </a:schemeClr>
+              </a:gs>
+            </a:gsLst>
+            <a:lin ang="13800000" scaled="0"/>
+          </a:gradFill>
+          <a:ln>
+            <a:noFill/>
+          </a:ln>
+        </p:spPr>
+        <p:style>
+          <a:lnRef idx="2">
+            <a:schemeClr val="accent1">
+              <a:shade val="50000"/>
+            </a:schemeClr>
+          </a:lnRef>
+          <a:fillRef idx="1">
+            <a:schemeClr val="accent1"/>
+          </a:fillRef>
+          <a:effectRef idx="0">
+            <a:schemeClr val="accent1"/>
+          </a:effectRef>
+          <a:fontRef idx="minor">
+            <a:schemeClr val="lt1"/>
+          </a:fontRef>
+        </p:style>
+        <p:txBody>
+          <a:bodyPr rtlCol="0" anchor="ctr"/>
+          <a:lstStyle/>
+          <a:p>
+            <a:pPr algn="ctr"/>
+            <a:endParaRPr lang="en-US"/>
+          </a:p>
+        </p:txBody>
+      </p:sp>
+      <p:sp>
+        <p:nvSpPr>
+          <p:cNvPr id="16" name="Rectangle 15">
+            <a:extLst>
+              <a:ext uri="{FF2B5EF4-FFF2-40B4-BE49-F238E27FC236}">
+                <a16:creationId xmlns:a16="http://schemas.microsoft.com/office/drawing/2014/main" id="{375E0459-6403-40CD-989D-56A4407CA12E}"/>
+              </a:ext>
+              <a:ext uri="{C183D7F6-B498-43B3-948B-1728B52AA6E4}">
+                <adec:decorative xmlns:adec="http://schemas.microsoft.com/office/drawing/2017/decorative" val="1"/>
+              </a:ext>
+            </a:extLst>
+          </p:cNvPr>
+          <p:cNvSpPr>
+            <a:spLocks noGrp="1" noRot="1" noChangeAspect="1" noMove="1" noResize="1" noEditPoints="1" noAdjustHandles="1" noChangeArrowheads="1" noChangeShapeType="1" noTextEdit="1"/>
+          </p:cNvSpPr>
+          <p:nvPr>
+            <p:extLst>
+              <p:ext uri="{386F3935-93C4-4BCD-93E2-E3B085C9AB24}">
+                <p16:designElem xmlns:p16="http://schemas.microsoft.com/office/powerpoint/2015/main" val="1"/>
+              </p:ext>
+            </p:extLst>
+          </p:nvPr>
+        </p:nvSpPr>
+        <p:spPr>
+          <a:xfrm flipH="1">
+            <a:off x="8115299" y="-1"/>
+            <a:ext cx="4076698" cy="1590742"/>
+          </a:xfrm>
+          <a:prstGeom prst="rect">
+            <a:avLst/>
+          </a:prstGeom>
+          <a:gradFill>
+            <a:gsLst>
+              <a:gs pos="0">
+                <a:schemeClr val="accent1">
+                  <a:alpha val="66000"/>
+                </a:schemeClr>
+              </a:gs>
+              <a:gs pos="100000">
+                <a:srgbClr val="000000">
+                  <a:alpha val="30000"/>
+                </a:srgbClr>
+              </a:gs>
+            </a:gsLst>
+            <a:lin ang="13200000" scaled="0"/>
+          </a:gradFill>
+          <a:ln>
+            <a:noFill/>
+          </a:ln>
+        </p:spPr>
+        <p:style>
+          <a:lnRef idx="2">
+            <a:schemeClr val="accent1">
+              <a:shade val="50000"/>
+            </a:schemeClr>
+          </a:lnRef>
+          <a:fillRef idx="1">
+            <a:schemeClr val="accent1"/>
+          </a:fillRef>
+          <a:effectRef idx="0">
+            <a:schemeClr val="accent1"/>
+          </a:effectRef>
+          <a:fontRef idx="minor">
+            <a:schemeClr val="lt1"/>
+          </a:fontRef>
+        </p:style>
+        <p:txBody>
+          <a:bodyPr rtlCol="0" anchor="ctr"/>
+          <a:lstStyle/>
+          <a:p>
+            <a:pPr algn="ctr"/>
+            <a:endParaRPr lang="en-US"/>
+          </a:p>
+        </p:txBody>
+      </p:sp>
+      <p:sp>
+        <p:nvSpPr>
+          <p:cNvPr id="18" name="Rectangle 17">
+            <a:extLst>
+              <a:ext uri="{FF2B5EF4-FFF2-40B4-BE49-F238E27FC236}">
+                <a16:creationId xmlns:a16="http://schemas.microsoft.com/office/drawing/2014/main" id="{53E5B1A8-3AC9-4BD1-9BBC-78CA94F2D1BA}"/>
+              </a:ext>
+              <a:ext uri="{C183D7F6-B498-43B3-948B-1728B52AA6E4}">
+                <adec:decorative xmlns:adec="http://schemas.microsoft.com/office/drawing/2017/decorative" val="1"/>
+              </a:ext>
+            </a:extLst>
+          </p:cNvPr>
+          <p:cNvSpPr>
+            <a:spLocks noGrp="1" noRot="1" noChangeAspect="1" noMove="1" noResize="1" noEditPoints="1" noAdjustHandles="1" noChangeArrowheads="1" noChangeShapeType="1" noTextEdit="1"/>
+          </p:cNvSpPr>
+          <p:nvPr>
+            <p:extLst>
+              <p:ext uri="{386F3935-93C4-4BCD-93E2-E3B085C9AB24}">
+                <p16:designElem xmlns:p16="http://schemas.microsoft.com/office/powerpoint/2015/main" val="1"/>
+              </p:ext>
+            </p:extLst>
+          </p:nvPr>
+        </p:nvSpPr>
+        <p:spPr>
+          <a:xfrm>
+            <a:off x="459350" y="-1"/>
+            <a:ext cx="11732646" cy="1597433"/>
+          </a:xfrm>
+          <a:prstGeom prst="rect">
+            <a:avLst/>
+          </a:prstGeom>
+          <a:gradFill>
+            <a:gsLst>
+              <a:gs pos="50000">
+                <a:srgbClr val="000000">
+                  <a:alpha val="0"/>
+                </a:srgbClr>
+              </a:gs>
+              <a:gs pos="99000">
+                <a:schemeClr val="accent1">
+                  <a:lumMod val="50000"/>
+                  <a:alpha val="52000"/>
+                </a:schemeClr>
+              </a:gs>
+            </a:gsLst>
+            <a:lin ang="16800000" scaled="0"/>
+          </a:gradFill>
+          <a:ln>
+            <a:noFill/>
+          </a:ln>
+        </p:spPr>
+        <p:style>
+          <a:lnRef idx="2">
+            <a:schemeClr val="accent1">
+              <a:shade val="50000"/>
+            </a:schemeClr>
+          </a:lnRef>
+          <a:fillRef idx="1">
+            <a:schemeClr val="accent1"/>
+          </a:fillRef>
+          <a:effectRef idx="0">
+            <a:schemeClr val="accent1"/>
+          </a:effectRef>
+          <a:fontRef idx="minor">
+            <a:schemeClr val="lt1"/>
+          </a:fontRef>
+        </p:style>
+        <p:txBody>
+          <a:bodyPr rtlCol="0" anchor="ctr"/>
+          <a:lstStyle/>
+          <a:p>
+            <a:pPr algn="ctr"/>
+            <a:endParaRPr lang="en-US"/>
+          </a:p>
+        </p:txBody>
+      </p:sp>
+      <p:sp>
+        <p:nvSpPr>
+          <p:cNvPr id="2" name="Título 1">
+            <a:extLst>
+              <a:ext uri="{FF2B5EF4-FFF2-40B4-BE49-F238E27FC236}">
+                <a16:creationId xmlns:a16="http://schemas.microsoft.com/office/drawing/2014/main" id="{EF85517E-742F-4026-8637-95803F5A7D9D}"/>
+              </a:ext>
+            </a:extLst>
+          </p:cNvPr>
+          <p:cNvSpPr>
+            <a:spLocks noGrp="1"/>
+          </p:cNvSpPr>
+          <p:nvPr>
+            <p:ph type="title"/>
+          </p:nvPr>
+        </p:nvSpPr>
+        <p:spPr>
+          <a:xfrm>
+            <a:off x="1371599" y="294538"/>
+            <a:ext cx="9895951" cy="1033669"/>
+          </a:xfrm>
+        </p:spPr>
+        <p:txBody>
+          <a:bodyPr>
+            <a:normAutofit/>
+          </a:bodyPr>
+          <a:lstStyle/>
+          <a:p>
+            <a:r>
+              <a:rPr lang="pt-PT" sz="4000" b="1">
+                <a:solidFill>
+                  <a:schemeClr val="bg1"/>
+                </a:solidFill>
+              </a:rPr>
+              <a:t>OAuth e OIDC </a:t>
+            </a:r>
+            <a:r>
+              <a:rPr lang="pt-PT" sz="4000" b="1" dirty="0">
+                <a:solidFill>
+                  <a:schemeClr val="bg1"/>
+                </a:solidFill>
+              </a:rPr>
+              <a:t>em Aplicações Móveis</a:t>
+            </a:r>
+          </a:p>
+        </p:txBody>
+      </p:sp>
+      <p:pic>
+        <p:nvPicPr>
+          <p:cNvPr id="5" name="Picture 8" descr="CINTESIS - Investigação">
+            <a:extLst>
+              <a:ext uri="{FF2B5EF4-FFF2-40B4-BE49-F238E27FC236}">
+                <a16:creationId xmlns:a16="http://schemas.microsoft.com/office/drawing/2014/main" id="{0C37D708-E047-4DFC-99EB-D3DD6D4B61CB}"/>
+              </a:ext>
+            </a:extLst>
+          </p:cNvPr>
+          <p:cNvPicPr>
+            <a:picLocks noChangeAspect="1" noChangeArrowheads="1"/>
+          </p:cNvPicPr>
+          <p:nvPr/>
+        </p:nvPicPr>
+        <p:blipFill>
+          <a:blip r:embed="rId2">
+            <a:extLst>
+              <a:ext uri="{28A0092B-C50C-407E-A947-70E740481C1C}">
+                <a14:useLocalDpi xmlns:a14="http://schemas.microsoft.com/office/drawing/2010/main" val="0"/>
+              </a:ext>
+            </a:extLst>
+          </a:blip>
+          <a:srcRect/>
+          <a:stretch>
+            <a:fillRect/>
+          </a:stretch>
+        </p:blipFill>
+        <p:spPr bwMode="auto">
+          <a:xfrm>
+            <a:off x="10820400" y="6172200"/>
+            <a:ext cx="1371600" cy="685800"/>
+          </a:xfrm>
+          <a:prstGeom prst="rect">
+            <a:avLst/>
+          </a:prstGeom>
+          <a:noFill/>
+          <a:extLst>
+            <a:ext uri="{909E8E84-426E-40DD-AFC4-6F175D3DCCD1}">
+              <a14:hiddenFill xmlns:a14="http://schemas.microsoft.com/office/drawing/2010/main">
+                <a:solidFill>
+                  <a:srgbClr val="FFFFFF"/>
+                </a:solidFill>
+              </a14:hiddenFill>
+            </a:ext>
+          </a:extLst>
+        </p:spPr>
+      </p:pic>
+      <p:pic>
+        <p:nvPicPr>
+          <p:cNvPr id="11" name="Imagem 10" descr="Uma imagem com mesa&#10;&#10;Descrição gerada automaticamente">
+            <a:extLst>
+              <a:ext uri="{FF2B5EF4-FFF2-40B4-BE49-F238E27FC236}">
+                <a16:creationId xmlns:a16="http://schemas.microsoft.com/office/drawing/2014/main" id="{DF998DB3-D6C0-4BD1-894E-C7C287BA2059}"/>
+              </a:ext>
+            </a:extLst>
+          </p:cNvPr>
+          <p:cNvPicPr>
+            <a:picLocks noChangeAspect="1"/>
+          </p:cNvPicPr>
+          <p:nvPr/>
+        </p:nvPicPr>
+        <p:blipFill>
+          <a:blip r:embed="rId3">
+            <a:extLst>
+              <a:ext uri="{28A0092B-C50C-407E-A947-70E740481C1C}">
+                <a14:useLocalDpi xmlns:a14="http://schemas.microsoft.com/office/drawing/2010/main" val="0"/>
+              </a:ext>
+            </a:extLst>
+          </a:blip>
+          <a:stretch>
+            <a:fillRect/>
+          </a:stretch>
+        </p:blipFill>
+        <p:spPr>
+          <a:xfrm>
+            <a:off x="1366828" y="1590741"/>
+            <a:ext cx="9453572" cy="5081170"/>
+          </a:xfrm>
+          <a:prstGeom prst="rect">
+            <a:avLst/>
+          </a:prstGeom>
+        </p:spPr>
+      </p:pic>
+      <p:sp>
+        <p:nvSpPr>
+          <p:cNvPr id="13" name="CaixaDeTexto 12">
+            <a:extLst>
+              <a:ext uri="{FF2B5EF4-FFF2-40B4-BE49-F238E27FC236}">
+                <a16:creationId xmlns:a16="http://schemas.microsoft.com/office/drawing/2014/main" id="{D433DA40-A91A-4863-96F7-A7958191FC7F}"/>
+              </a:ext>
+            </a:extLst>
+          </p:cNvPr>
+          <p:cNvSpPr txBox="1"/>
+          <p:nvPr/>
+        </p:nvSpPr>
+        <p:spPr>
+          <a:xfrm>
+            <a:off x="7994603" y="2131077"/>
+            <a:ext cx="481264" cy="234000"/>
+          </a:xfrm>
+          <a:prstGeom prst="rect">
+            <a:avLst/>
+          </a:prstGeom>
+          <a:solidFill>
+            <a:schemeClr val="bg1"/>
+          </a:solidFill>
+        </p:spPr>
+        <p:txBody>
+          <a:bodyPr wrap="square" rtlCol="0">
+            <a:spAutoFit/>
+          </a:bodyPr>
+          <a:lstStyle/>
+          <a:p>
+            <a:r>
+              <a:rPr lang="pt-PT" dirty="0">
+                <a:solidFill>
+                  <a:schemeClr val="bg1"/>
+                </a:solidFill>
+              </a:rPr>
+              <a:t>a</a:t>
+            </a:r>
+          </a:p>
+        </p:txBody>
+      </p:sp>
+      <p:sp>
+        <p:nvSpPr>
+          <p:cNvPr id="15" name="CaixaDeTexto 14">
+            <a:extLst>
+              <a:ext uri="{FF2B5EF4-FFF2-40B4-BE49-F238E27FC236}">
+                <a16:creationId xmlns:a16="http://schemas.microsoft.com/office/drawing/2014/main" id="{CA96252C-158A-4BF1-B06F-AC4F6C1B15A9}"/>
+              </a:ext>
+            </a:extLst>
+          </p:cNvPr>
+          <p:cNvSpPr txBox="1"/>
+          <p:nvPr/>
+        </p:nvSpPr>
+        <p:spPr>
+          <a:xfrm>
+            <a:off x="7994603" y="5836804"/>
+            <a:ext cx="481264" cy="234000"/>
+          </a:xfrm>
+          <a:prstGeom prst="rect">
+            <a:avLst/>
+          </a:prstGeom>
+          <a:solidFill>
+            <a:schemeClr val="bg1"/>
+          </a:solidFill>
+        </p:spPr>
+        <p:txBody>
+          <a:bodyPr wrap="square" rtlCol="0">
+            <a:spAutoFit/>
+          </a:bodyPr>
+          <a:lstStyle/>
+          <a:p>
+            <a:r>
+              <a:rPr lang="pt-PT" dirty="0">
+                <a:solidFill>
+                  <a:schemeClr val="bg1"/>
+                </a:solidFill>
+              </a:rPr>
+              <a:t>a</a:t>
+            </a:r>
+          </a:p>
+        </p:txBody>
+      </p:sp>
+    </p:spTree>
+    <p:extLst>
+      <p:ext uri="{BB962C8B-B14F-4D97-AF65-F5344CB8AC3E}">
+        <p14:creationId xmlns:p14="http://schemas.microsoft.com/office/powerpoint/2010/main" val="849255015"/>
       </p:ext>
     </p:extLst>
   </p:cSld>

</xml_diff>